<commit_message>
updated cole lecture 5 slides
</commit_message>
<xml_diff>
--- a/main/lectures/05-booleans-and-assert/Lecture_5_Cole.pptx
+++ b/main/lectures/05-booleans-and-assert/Lecture_5_Cole.pptx
@@ -45,29 +45,28 @@
     <p:sldId id="290" r:id="rId40"/>
     <p:sldId id="291" r:id="rId41"/>
     <p:sldId id="292" r:id="rId42"/>
-    <p:sldId id="293" r:id="rId43"/>
   </p:sldIdLst>
   <p:sldSz cy="5143500" cx="9144000"/>
   <p:notesSz cx="6858000" cy="9144000"/>
   <p:embeddedFontLst>
     <p:embeddedFont>
       <p:font typeface="Roboto Slab"/>
-      <p:regular r:id="rId44"/>
-      <p:bold r:id="rId45"/>
+      <p:regular r:id="rId43"/>
+      <p:bold r:id="rId44"/>
     </p:embeddedFont>
     <p:embeddedFont>
       <p:font typeface="Roboto"/>
-      <p:regular r:id="rId46"/>
-      <p:bold r:id="rId47"/>
-      <p:italic r:id="rId48"/>
-      <p:boldItalic r:id="rId49"/>
+      <p:regular r:id="rId45"/>
+      <p:bold r:id="rId46"/>
+      <p:italic r:id="rId47"/>
+      <p:boldItalic r:id="rId48"/>
     </p:embeddedFont>
     <p:embeddedFont>
       <p:font typeface="Century Gothic"/>
-      <p:regular r:id="rId50"/>
-      <p:bold r:id="rId51"/>
-      <p:italic r:id="rId52"/>
-      <p:boldItalic r:id="rId53"/>
+      <p:regular r:id="rId49"/>
+      <p:bold r:id="rId50"/>
+      <p:italic r:id="rId51"/>
+      <p:boldItalic r:id="rId52"/>
     </p:embeddedFont>
   </p:embeddedFontLst>
   <p:defaultTextStyle>
@@ -2826,46 +2825,7 @@
       </p:grpSpPr>
       <p:sp>
         <p:nvSpPr>
-          <p:cNvPr id="374" name="Google Shape;374;g1b63a6b7a24_1_222:notes"/>
-          <p:cNvSpPr txBox="1"/>
-          <p:nvPr>
-            <p:ph idx="1" type="body"/>
-          </p:nvPr>
-        </p:nvSpPr>
-        <p:spPr>
-          <a:xfrm>
-            <a:off x="685800" y="4400550"/>
-            <a:ext cx="5486400" cy="3600450"/>
-          </a:xfrm>
-          <a:prstGeom prst="rect">
-            <a:avLst/>
-          </a:prstGeom>
-        </p:spPr>
-        <p:txBody>
-          <a:bodyPr anchorCtr="0" anchor="t" bIns="91425" lIns="91425" spcFirstLastPara="1" rIns="91425" wrap="square" tIns="91425">
-            <a:noAutofit/>
-          </a:bodyPr>
-          <a:lstStyle/>
-          <a:p>
-            <a:pPr indent="0" lvl="0" marL="0" rtl="0" algn="l">
-              <a:spcBef>
-                <a:spcPts val="0"/>
-              </a:spcBef>
-              <a:spcAft>
-                <a:spcPts val="0"/>
-              </a:spcAft>
-              <a:buNone/>
-            </a:pPr>
-            <a:r>
-              <a:t/>
-            </a:r>
-            <a:endParaRPr/>
-          </a:p>
-        </p:txBody>
-      </p:sp>
-      <p:sp>
-        <p:nvSpPr>
-          <p:cNvPr id="375" name="Google Shape;375;g1b63a6b7a24_1_222:notes"/>
+          <p:cNvPr id="374" name="Google Shape;374;g20e842758a6_0_127:notes"/>
           <p:cNvSpPr/>
           <p:nvPr>
             <p:ph idx="2" type="sldImg"/>
@@ -2873,8 +2833,8 @@
         </p:nvSpPr>
         <p:spPr>
           <a:xfrm>
-            <a:off x="685800" y="1143000"/>
-            <a:ext cx="5486400" cy="3086100"/>
+            <a:off x="381300" y="685800"/>
+            <a:ext cx="6096000" cy="3429000"/>
           </a:xfrm>
           <a:custGeom>
             <a:rect b="b" l="l" r="r" t="t"/>
@@ -2897,6 +2857,45 @@
             </a:pathLst>
           </a:custGeom>
         </p:spPr>
+      </p:sp>
+      <p:sp>
+        <p:nvSpPr>
+          <p:cNvPr id="375" name="Google Shape;375;g20e842758a6_0_127:notes"/>
+          <p:cNvSpPr txBox="1"/>
+          <p:nvPr>
+            <p:ph idx="1" type="body"/>
+          </p:nvPr>
+        </p:nvSpPr>
+        <p:spPr>
+          <a:xfrm>
+            <a:off x="685800" y="4343400"/>
+            <a:ext cx="5486400" cy="4114800"/>
+          </a:xfrm>
+          <a:prstGeom prst="rect">
+            <a:avLst/>
+          </a:prstGeom>
+        </p:spPr>
+        <p:txBody>
+          <a:bodyPr anchorCtr="0" anchor="t" bIns="91425" lIns="91425" spcFirstLastPara="1" rIns="91425" wrap="square" tIns="91425">
+            <a:noAutofit/>
+          </a:bodyPr>
+          <a:lstStyle/>
+          <a:p>
+            <a:pPr indent="0" lvl="0" marL="0" rtl="0" algn="l">
+              <a:spcBef>
+                <a:spcPts val="0"/>
+              </a:spcBef>
+              <a:spcAft>
+                <a:spcPts val="0"/>
+              </a:spcAft>
+              <a:buNone/>
+            </a:pPr>
+            <a:r>
+              <a:t/>
+            </a:r>
+            <a:endParaRPr/>
+          </a:p>
+        </p:txBody>
       </p:sp>
     </p:spTree>
   </p:cSld>
@@ -3010,7 +3009,7 @@
   <p:cSld>
     <p:spTree>
       <p:nvGrpSpPr>
-        <p:cNvPr id="380" name="Shape 380"/>
+        <p:cNvPr id="379" name="Shape 379"/>
         <p:cNvGrpSpPr/>
         <p:nvPr/>
       </p:nvGrpSpPr>
@@ -3024,7 +3023,46 @@
       </p:grpSpPr>
       <p:sp>
         <p:nvSpPr>
-          <p:cNvPr id="381" name="Google Shape;381;g20e842758a6_0_127:notes"/>
+          <p:cNvPr id="380" name="Google Shape;380;g1b63a6b7a24_1_228:notes"/>
+          <p:cNvSpPr txBox="1"/>
+          <p:nvPr>
+            <p:ph idx="1" type="body"/>
+          </p:nvPr>
+        </p:nvSpPr>
+        <p:spPr>
+          <a:xfrm>
+            <a:off x="685800" y="4400550"/>
+            <a:ext cx="5486400" cy="3600450"/>
+          </a:xfrm>
+          <a:prstGeom prst="rect">
+            <a:avLst/>
+          </a:prstGeom>
+        </p:spPr>
+        <p:txBody>
+          <a:bodyPr anchorCtr="0" anchor="t" bIns="91425" lIns="91425" spcFirstLastPara="1" rIns="91425" wrap="square" tIns="91425">
+            <a:noAutofit/>
+          </a:bodyPr>
+          <a:lstStyle/>
+          <a:p>
+            <a:pPr indent="0" lvl="0" marL="0" rtl="0" algn="l">
+              <a:spcBef>
+                <a:spcPts val="0"/>
+              </a:spcBef>
+              <a:spcAft>
+                <a:spcPts val="0"/>
+              </a:spcAft>
+              <a:buNone/>
+            </a:pPr>
+            <a:r>
+              <a:t/>
+            </a:r>
+            <a:endParaRPr/>
+          </a:p>
+        </p:txBody>
+      </p:sp>
+      <p:sp>
+        <p:nvSpPr>
+          <p:cNvPr id="381" name="Google Shape;381;g1b63a6b7a24_1_228:notes"/>
           <p:cNvSpPr/>
           <p:nvPr>
             <p:ph idx="2" type="sldImg"/>
@@ -3032,8 +3070,8 @@
         </p:nvSpPr>
         <p:spPr>
           <a:xfrm>
-            <a:off x="381300" y="685800"/>
-            <a:ext cx="6096000" cy="3429000"/>
+            <a:off x="685800" y="1143000"/>
+            <a:ext cx="5486400" cy="3086100"/>
           </a:xfrm>
           <a:custGeom>
             <a:rect b="b" l="l" r="r" t="t"/>
@@ -3057,45 +3095,6 @@
           </a:custGeom>
         </p:spPr>
       </p:sp>
-      <p:sp>
-        <p:nvSpPr>
-          <p:cNvPr id="382" name="Google Shape;382;g20e842758a6_0_127:notes"/>
-          <p:cNvSpPr txBox="1"/>
-          <p:nvPr>
-            <p:ph idx="1" type="body"/>
-          </p:nvPr>
-        </p:nvSpPr>
-        <p:spPr>
-          <a:xfrm>
-            <a:off x="685800" y="4343400"/>
-            <a:ext cx="5486400" cy="4114800"/>
-          </a:xfrm>
-          <a:prstGeom prst="rect">
-            <a:avLst/>
-          </a:prstGeom>
-        </p:spPr>
-        <p:txBody>
-          <a:bodyPr anchorCtr="0" anchor="t" bIns="91425" lIns="91425" spcFirstLastPara="1" rIns="91425" wrap="square" tIns="91425">
-            <a:noAutofit/>
-          </a:bodyPr>
-          <a:lstStyle/>
-          <a:p>
-            <a:pPr indent="0" lvl="0" marL="0" rtl="0" algn="l">
-              <a:spcBef>
-                <a:spcPts val="0"/>
-              </a:spcBef>
-              <a:spcAft>
-                <a:spcPts val="0"/>
-              </a:spcAft>
-              <a:buNone/>
-            </a:pPr>
-            <a:r>
-              <a:t/>
-            </a:r>
-            <a:endParaRPr/>
-          </a:p>
-        </p:txBody>
-      </p:sp>
     </p:spTree>
   </p:cSld>
   <p:clrMapOvr>
@@ -3109,7 +3108,7 @@
   <p:cSld>
     <p:spTree>
       <p:nvGrpSpPr>
-        <p:cNvPr id="386" name="Shape 386"/>
+        <p:cNvPr id="387" name="Shape 387"/>
         <p:cNvGrpSpPr/>
         <p:nvPr/>
       </p:nvGrpSpPr>
@@ -3123,7 +3122,7 @@
       </p:grpSpPr>
       <p:sp>
         <p:nvSpPr>
-          <p:cNvPr id="387" name="Google Shape;387;g1b63a6b7a24_1_228:notes"/>
+          <p:cNvPr id="388" name="Google Shape;388;g1b63a6b7a24_1_235:notes"/>
           <p:cNvSpPr txBox="1"/>
           <p:nvPr>
             <p:ph idx="1" type="body"/>
@@ -3162,7 +3161,7 @@
       </p:sp>
       <p:sp>
         <p:nvSpPr>
-          <p:cNvPr id="388" name="Google Shape;388;g1b63a6b7a24_1_228:notes"/>
+          <p:cNvPr id="389" name="Google Shape;389;g1b63a6b7a24_1_235:notes"/>
           <p:cNvSpPr/>
           <p:nvPr>
             <p:ph idx="2" type="sldImg"/>
@@ -3208,7 +3207,7 @@
   <p:cSld>
     <p:spTree>
       <p:nvGrpSpPr>
-        <p:cNvPr id="394" name="Shape 394"/>
+        <p:cNvPr id="395" name="Shape 395"/>
         <p:cNvGrpSpPr/>
         <p:nvPr/>
       </p:nvGrpSpPr>
@@ -3222,7 +3221,106 @@
       </p:grpSpPr>
       <p:sp>
         <p:nvSpPr>
-          <p:cNvPr id="395" name="Google Shape;395;g1b63a6b7a24_1_235:notes"/>
+          <p:cNvPr id="396" name="Google Shape;396;g1b638a6e53b_0_142:notes"/>
+          <p:cNvSpPr/>
+          <p:nvPr>
+            <p:ph idx="2" type="sldImg"/>
+          </p:nvPr>
+        </p:nvSpPr>
+        <p:spPr>
+          <a:xfrm>
+            <a:off x="381300" y="685800"/>
+            <a:ext cx="6096000" cy="3429000"/>
+          </a:xfrm>
+          <a:custGeom>
+            <a:rect b="b" l="l" r="r" t="t"/>
+            <a:pathLst>
+              <a:path extrusionOk="0" h="120000" w="120000">
+                <a:moveTo>
+                  <a:pt x="0" y="0"/>
+                </a:moveTo>
+                <a:lnTo>
+                  <a:pt x="120000" y="0"/>
+                </a:lnTo>
+                <a:lnTo>
+                  <a:pt x="120000" y="120000"/>
+                </a:lnTo>
+                <a:lnTo>
+                  <a:pt x="0" y="120000"/>
+                </a:lnTo>
+                <a:close/>
+              </a:path>
+            </a:pathLst>
+          </a:custGeom>
+        </p:spPr>
+      </p:sp>
+      <p:sp>
+        <p:nvSpPr>
+          <p:cNvPr id="397" name="Google Shape;397;g1b638a6e53b_0_142:notes"/>
+          <p:cNvSpPr txBox="1"/>
+          <p:nvPr>
+            <p:ph idx="1" type="body"/>
+          </p:nvPr>
+        </p:nvSpPr>
+        <p:spPr>
+          <a:xfrm>
+            <a:off x="685800" y="4343400"/>
+            <a:ext cx="5486400" cy="4114800"/>
+          </a:xfrm>
+          <a:prstGeom prst="rect">
+            <a:avLst/>
+          </a:prstGeom>
+        </p:spPr>
+        <p:txBody>
+          <a:bodyPr anchorCtr="0" anchor="t" bIns="91425" lIns="91425" spcFirstLastPara="1" rIns="91425" wrap="square" tIns="91425">
+            <a:noAutofit/>
+          </a:bodyPr>
+          <a:lstStyle/>
+          <a:p>
+            <a:pPr indent="0" lvl="0" marL="0" rtl="0" algn="l">
+              <a:spcBef>
+                <a:spcPts val="0"/>
+              </a:spcBef>
+              <a:spcAft>
+                <a:spcPts val="0"/>
+              </a:spcAft>
+              <a:buNone/>
+            </a:pPr>
+            <a:r>
+              <a:t/>
+            </a:r>
+            <a:endParaRPr/>
+          </a:p>
+        </p:txBody>
+      </p:sp>
+    </p:spTree>
+  </p:cSld>
+  <p:clrMapOvr>
+    <a:masterClrMapping/>
+  </p:clrMapOvr>
+</p:notes>
+</file>
+
+<file path=ppt/notesSlides/notesSlide33.xml><?xml version="1.0" encoding="utf-8"?>
+<p:notes xmlns:a="http://schemas.openxmlformats.org/drawingml/2006/main" xmlns:r="http://schemas.openxmlformats.org/officeDocument/2006/relationships" xmlns:mc="http://schemas.openxmlformats.org/markup-compatibility/2006" xmlns:mv="urn:schemas-microsoft-com:mac:vml" xmlns:p="http://schemas.openxmlformats.org/presentationml/2006/main" xmlns:c="http://schemas.openxmlformats.org/drawingml/2006/chart" xmlns:dgm="http://schemas.openxmlformats.org/drawingml/2006/diagram" xmlns:o="urn:schemas-microsoft-com:office:office" xmlns:v="urn:schemas-microsoft-com:vml" xmlns:pvml="urn:schemas-microsoft-com:office:powerpoint" xmlns:com="http://schemas.openxmlformats.org/drawingml/2006/compatibility" xmlns:p14="http://schemas.microsoft.com/office/powerpoint/2010/main" xmlns:p15="http://schemas.microsoft.com/office/powerpoint/2012/main" xmlns:ahyp="http://schemas.microsoft.com/office/drawing/2018/hyperlinkcolor" showMasterPhAnim="0" showMasterSp="0">
+  <p:cSld>
+    <p:spTree>
+      <p:nvGrpSpPr>
+        <p:cNvPr id="401" name="Shape 401"/>
+        <p:cNvGrpSpPr/>
+        <p:nvPr/>
+      </p:nvGrpSpPr>
+      <p:grpSpPr>
+        <a:xfrm>
+          <a:off x="0" y="0"/>
+          <a:ext cx="0" cy="0"/>
+          <a:chOff x="0" y="0"/>
+          <a:chExt cx="0" cy="0"/>
+        </a:xfrm>
+      </p:grpSpPr>
+      <p:sp>
+        <p:nvSpPr>
+          <p:cNvPr id="402" name="Google Shape;402;g1b63a6b7a24_1_248:notes"/>
           <p:cNvSpPr txBox="1"/>
           <p:nvPr>
             <p:ph idx="1" type="body"/>
@@ -3261,7 +3359,7 @@
       </p:sp>
       <p:sp>
         <p:nvSpPr>
-          <p:cNvPr id="396" name="Google Shape;396;g1b63a6b7a24_1_235:notes"/>
+          <p:cNvPr id="403" name="Google Shape;403;g1b63a6b7a24_1_248:notes"/>
           <p:cNvSpPr/>
           <p:nvPr>
             <p:ph idx="2" type="sldImg"/>
@@ -3302,12 +3400,12 @@
 </p:notes>
 </file>
 
-<file path=ppt/notesSlides/notesSlide33.xml><?xml version="1.0" encoding="utf-8"?>
+<file path=ppt/notesSlides/notesSlide34.xml><?xml version="1.0" encoding="utf-8"?>
 <p:notes xmlns:a="http://schemas.openxmlformats.org/drawingml/2006/main" xmlns:r="http://schemas.openxmlformats.org/officeDocument/2006/relationships" xmlns:mc="http://schemas.openxmlformats.org/markup-compatibility/2006" xmlns:mv="urn:schemas-microsoft-com:mac:vml" xmlns:p="http://schemas.openxmlformats.org/presentationml/2006/main" xmlns:c="http://schemas.openxmlformats.org/drawingml/2006/chart" xmlns:dgm="http://schemas.openxmlformats.org/drawingml/2006/diagram" xmlns:o="urn:schemas-microsoft-com:office:office" xmlns:v="urn:schemas-microsoft-com:vml" xmlns:pvml="urn:schemas-microsoft-com:office:powerpoint" xmlns:com="http://schemas.openxmlformats.org/drawingml/2006/compatibility" xmlns:p14="http://schemas.microsoft.com/office/powerpoint/2010/main" xmlns:p15="http://schemas.microsoft.com/office/powerpoint/2012/main" xmlns:ahyp="http://schemas.microsoft.com/office/drawing/2018/hyperlinkcolor" showMasterPhAnim="0" showMasterSp="0">
   <p:cSld>
     <p:spTree>
       <p:nvGrpSpPr>
-        <p:cNvPr id="402" name="Shape 402"/>
+        <p:cNvPr id="409" name="Shape 409"/>
         <p:cNvGrpSpPr/>
         <p:nvPr/>
       </p:nvGrpSpPr>
@@ -3321,106 +3419,7 @@
       </p:grpSpPr>
       <p:sp>
         <p:nvSpPr>
-          <p:cNvPr id="403" name="Google Shape;403;g1b638a6e53b_0_142:notes"/>
-          <p:cNvSpPr/>
-          <p:nvPr>
-            <p:ph idx="2" type="sldImg"/>
-          </p:nvPr>
-        </p:nvSpPr>
-        <p:spPr>
-          <a:xfrm>
-            <a:off x="381300" y="685800"/>
-            <a:ext cx="6096000" cy="3429000"/>
-          </a:xfrm>
-          <a:custGeom>
-            <a:rect b="b" l="l" r="r" t="t"/>
-            <a:pathLst>
-              <a:path extrusionOk="0" h="120000" w="120000">
-                <a:moveTo>
-                  <a:pt x="0" y="0"/>
-                </a:moveTo>
-                <a:lnTo>
-                  <a:pt x="120000" y="0"/>
-                </a:lnTo>
-                <a:lnTo>
-                  <a:pt x="120000" y="120000"/>
-                </a:lnTo>
-                <a:lnTo>
-                  <a:pt x="0" y="120000"/>
-                </a:lnTo>
-                <a:close/>
-              </a:path>
-            </a:pathLst>
-          </a:custGeom>
-        </p:spPr>
-      </p:sp>
-      <p:sp>
-        <p:nvSpPr>
-          <p:cNvPr id="404" name="Google Shape;404;g1b638a6e53b_0_142:notes"/>
-          <p:cNvSpPr txBox="1"/>
-          <p:nvPr>
-            <p:ph idx="1" type="body"/>
-          </p:nvPr>
-        </p:nvSpPr>
-        <p:spPr>
-          <a:xfrm>
-            <a:off x="685800" y="4343400"/>
-            <a:ext cx="5486400" cy="4114800"/>
-          </a:xfrm>
-          <a:prstGeom prst="rect">
-            <a:avLst/>
-          </a:prstGeom>
-        </p:spPr>
-        <p:txBody>
-          <a:bodyPr anchorCtr="0" anchor="t" bIns="91425" lIns="91425" spcFirstLastPara="1" rIns="91425" wrap="square" tIns="91425">
-            <a:noAutofit/>
-          </a:bodyPr>
-          <a:lstStyle/>
-          <a:p>
-            <a:pPr indent="0" lvl="0" marL="0" rtl="0" algn="l">
-              <a:spcBef>
-                <a:spcPts val="0"/>
-              </a:spcBef>
-              <a:spcAft>
-                <a:spcPts val="0"/>
-              </a:spcAft>
-              <a:buNone/>
-            </a:pPr>
-            <a:r>
-              <a:t/>
-            </a:r>
-            <a:endParaRPr/>
-          </a:p>
-        </p:txBody>
-      </p:sp>
-    </p:spTree>
-  </p:cSld>
-  <p:clrMapOvr>
-    <a:masterClrMapping/>
-  </p:clrMapOvr>
-</p:notes>
-</file>
-
-<file path=ppt/notesSlides/notesSlide34.xml><?xml version="1.0" encoding="utf-8"?>
-<p:notes xmlns:a="http://schemas.openxmlformats.org/drawingml/2006/main" xmlns:r="http://schemas.openxmlformats.org/officeDocument/2006/relationships" xmlns:mc="http://schemas.openxmlformats.org/markup-compatibility/2006" xmlns:mv="urn:schemas-microsoft-com:mac:vml" xmlns:p="http://schemas.openxmlformats.org/presentationml/2006/main" xmlns:c="http://schemas.openxmlformats.org/drawingml/2006/chart" xmlns:dgm="http://schemas.openxmlformats.org/drawingml/2006/diagram" xmlns:o="urn:schemas-microsoft-com:office:office" xmlns:v="urn:schemas-microsoft-com:vml" xmlns:pvml="urn:schemas-microsoft-com:office:powerpoint" xmlns:com="http://schemas.openxmlformats.org/drawingml/2006/compatibility" xmlns:p14="http://schemas.microsoft.com/office/powerpoint/2010/main" xmlns:p15="http://schemas.microsoft.com/office/powerpoint/2012/main" xmlns:ahyp="http://schemas.microsoft.com/office/drawing/2018/hyperlinkcolor" showMasterPhAnim="0" showMasterSp="0">
-  <p:cSld>
-    <p:spTree>
-      <p:nvGrpSpPr>
-        <p:cNvPr id="408" name="Shape 408"/>
-        <p:cNvGrpSpPr/>
-        <p:nvPr/>
-      </p:nvGrpSpPr>
-      <p:grpSpPr>
-        <a:xfrm>
-          <a:off x="0" y="0"/>
-          <a:ext cx="0" cy="0"/>
-          <a:chOff x="0" y="0"/>
-          <a:chExt cx="0" cy="0"/>
-        </a:xfrm>
-      </p:grpSpPr>
-      <p:sp>
-        <p:nvSpPr>
-          <p:cNvPr id="409" name="Google Shape;409;g1b63a6b7a24_1_248:notes"/>
+          <p:cNvPr id="410" name="Google Shape;410;g1b63a6b7a24_1_259:notes"/>
           <p:cNvSpPr txBox="1"/>
           <p:nvPr>
             <p:ph idx="1" type="body"/>
@@ -3459,7 +3458,7 @@
       </p:sp>
       <p:sp>
         <p:nvSpPr>
-          <p:cNvPr id="410" name="Google Shape;410;g1b63a6b7a24_1_248:notes"/>
+          <p:cNvPr id="411" name="Google Shape;411;g1b63a6b7a24_1_259:notes"/>
           <p:cNvSpPr/>
           <p:nvPr>
             <p:ph idx="2" type="sldImg"/>
@@ -3505,7 +3504,7 @@
   <p:cSld>
     <p:spTree>
       <p:nvGrpSpPr>
-        <p:cNvPr id="416" name="Shape 416"/>
+        <p:cNvPr id="415" name="Shape 415"/>
         <p:cNvGrpSpPr/>
         <p:nvPr/>
       </p:nvGrpSpPr>
@@ -3519,7 +3518,42 @@
       </p:grpSpPr>
       <p:sp>
         <p:nvSpPr>
-          <p:cNvPr id="417" name="Google Shape;417;g1b63a6b7a24_1_259:notes"/>
+          <p:cNvPr id="416" name="Google Shape;416;g2080bffbc39_0_40:notes"/>
+          <p:cNvSpPr/>
+          <p:nvPr>
+            <p:ph idx="2" type="sldImg"/>
+          </p:nvPr>
+        </p:nvSpPr>
+        <p:spPr>
+          <a:xfrm>
+            <a:off x="381300" y="685800"/>
+            <a:ext cx="6096000" cy="3429000"/>
+          </a:xfrm>
+          <a:custGeom>
+            <a:rect b="b" l="l" r="r" t="t"/>
+            <a:pathLst>
+              <a:path extrusionOk="0" h="120000" w="120000">
+                <a:moveTo>
+                  <a:pt x="0" y="0"/>
+                </a:moveTo>
+                <a:lnTo>
+                  <a:pt x="120000" y="0"/>
+                </a:lnTo>
+                <a:lnTo>
+                  <a:pt x="120000" y="120000"/>
+                </a:lnTo>
+                <a:lnTo>
+                  <a:pt x="0" y="120000"/>
+                </a:lnTo>
+                <a:close/>
+              </a:path>
+            </a:pathLst>
+          </a:custGeom>
+        </p:spPr>
+      </p:sp>
+      <p:sp>
+        <p:nvSpPr>
+          <p:cNvPr id="417" name="Google Shape;417;g2080bffbc39_0_40:notes"/>
           <p:cNvSpPr txBox="1"/>
           <p:nvPr>
             <p:ph idx="1" type="body"/>
@@ -3527,8 +3561,8 @@
         </p:nvSpPr>
         <p:spPr>
           <a:xfrm>
-            <a:off x="685800" y="4400550"/>
-            <a:ext cx="5486400" cy="3600450"/>
+            <a:off x="685800" y="4343400"/>
+            <a:ext cx="5486400" cy="4114800"/>
           </a:xfrm>
           <a:prstGeom prst="rect">
             <a:avLst/>
@@ -3556,9 +3590,73 @@
           </a:p>
         </p:txBody>
       </p:sp>
+    </p:spTree>
+  </p:cSld>
+  <p:clrMapOvr>
+    <a:masterClrMapping/>
+  </p:clrMapOvr>
+</p:notes>
+</file>
+
+<file path=ppt/notesSlides/notesSlide36.xml><?xml version="1.0" encoding="utf-8"?>
+<p:notes xmlns:a="http://schemas.openxmlformats.org/drawingml/2006/main" xmlns:r="http://schemas.openxmlformats.org/officeDocument/2006/relationships" xmlns:mc="http://schemas.openxmlformats.org/markup-compatibility/2006" xmlns:mv="urn:schemas-microsoft-com:mac:vml" xmlns:p="http://schemas.openxmlformats.org/presentationml/2006/main" xmlns:c="http://schemas.openxmlformats.org/drawingml/2006/chart" xmlns:dgm="http://schemas.openxmlformats.org/drawingml/2006/diagram" xmlns:o="urn:schemas-microsoft-com:office:office" xmlns:v="urn:schemas-microsoft-com:vml" xmlns:pvml="urn:schemas-microsoft-com:office:powerpoint" xmlns:com="http://schemas.openxmlformats.org/drawingml/2006/compatibility" xmlns:p14="http://schemas.microsoft.com/office/powerpoint/2010/main" xmlns:p15="http://schemas.microsoft.com/office/powerpoint/2012/main" xmlns:ahyp="http://schemas.microsoft.com/office/drawing/2018/hyperlinkcolor" showMasterPhAnim="0" showMasterSp="0">
+  <p:cSld>
+    <p:spTree>
+      <p:nvGrpSpPr>
+        <p:cNvPr id="421" name="Shape 421"/>
+        <p:cNvGrpSpPr/>
+        <p:nvPr/>
+      </p:nvGrpSpPr>
+      <p:grpSpPr>
+        <a:xfrm>
+          <a:off x="0" y="0"/>
+          <a:ext cx="0" cy="0"/>
+          <a:chOff x="0" y="0"/>
+          <a:chExt cx="0" cy="0"/>
+        </a:xfrm>
+      </p:grpSpPr>
       <p:sp>
         <p:nvSpPr>
-          <p:cNvPr id="418" name="Google Shape;418;g1b63a6b7a24_1_259:notes"/>
+          <p:cNvPr id="422" name="Google Shape;422;g2080bffbc39_0_45:notes"/>
+          <p:cNvSpPr txBox="1"/>
+          <p:nvPr>
+            <p:ph idx="1" type="body"/>
+          </p:nvPr>
+        </p:nvSpPr>
+        <p:spPr>
+          <a:xfrm>
+            <a:off x="685800" y="4400550"/>
+            <a:ext cx="5486400" cy="3600600"/>
+          </a:xfrm>
+          <a:prstGeom prst="rect">
+            <a:avLst/>
+          </a:prstGeom>
+        </p:spPr>
+        <p:txBody>
+          <a:bodyPr anchorCtr="0" anchor="t" bIns="91425" lIns="91425" spcFirstLastPara="1" rIns="91425" wrap="square" tIns="91425">
+            <a:noAutofit/>
+          </a:bodyPr>
+          <a:lstStyle/>
+          <a:p>
+            <a:pPr indent="0" lvl="0" marL="0" rtl="0" algn="l">
+              <a:spcBef>
+                <a:spcPts val="0"/>
+              </a:spcBef>
+              <a:spcAft>
+                <a:spcPts val="0"/>
+              </a:spcAft>
+              <a:buNone/>
+            </a:pPr>
+            <a:r>
+              <a:t/>
+            </a:r>
+            <a:endParaRPr/>
+          </a:p>
+        </p:txBody>
+      </p:sp>
+      <p:sp>
+        <p:nvSpPr>
+          <p:cNvPr id="423" name="Google Shape;423;g2080bffbc39_0_45:notes"/>
           <p:cNvSpPr/>
           <p:nvPr>
             <p:ph idx="2" type="sldImg"/>
@@ -3599,12 +3697,12 @@
 </p:notes>
 </file>
 
-<file path=ppt/notesSlides/notesSlide36.xml><?xml version="1.0" encoding="utf-8"?>
+<file path=ppt/notesSlides/notesSlide37.xml><?xml version="1.0" encoding="utf-8"?>
 <p:notes xmlns:a="http://schemas.openxmlformats.org/drawingml/2006/main" xmlns:r="http://schemas.openxmlformats.org/officeDocument/2006/relationships" xmlns:mc="http://schemas.openxmlformats.org/markup-compatibility/2006" xmlns:mv="urn:schemas-microsoft-com:mac:vml" xmlns:p="http://schemas.openxmlformats.org/presentationml/2006/main" xmlns:c="http://schemas.openxmlformats.org/drawingml/2006/chart" xmlns:dgm="http://schemas.openxmlformats.org/drawingml/2006/diagram" xmlns:o="urn:schemas-microsoft-com:office:office" xmlns:v="urn:schemas-microsoft-com:vml" xmlns:pvml="urn:schemas-microsoft-com:office:powerpoint" xmlns:com="http://schemas.openxmlformats.org/drawingml/2006/compatibility" xmlns:p14="http://schemas.microsoft.com/office/powerpoint/2010/main" xmlns:p15="http://schemas.microsoft.com/office/powerpoint/2012/main" xmlns:ahyp="http://schemas.microsoft.com/office/drawing/2018/hyperlinkcolor" showMasterPhAnim="0" showMasterSp="0">
   <p:cSld>
     <p:spTree>
       <p:nvGrpSpPr>
-        <p:cNvPr id="422" name="Shape 422"/>
+        <p:cNvPr id="442" name="Shape 442"/>
         <p:cNvGrpSpPr/>
         <p:nvPr/>
       </p:nvGrpSpPr>
@@ -3618,106 +3716,7 @@
       </p:grpSpPr>
       <p:sp>
         <p:nvSpPr>
-          <p:cNvPr id="423" name="Google Shape;423;g2080bffbc39_0_40:notes"/>
-          <p:cNvSpPr/>
-          <p:nvPr>
-            <p:ph idx="2" type="sldImg"/>
-          </p:nvPr>
-        </p:nvSpPr>
-        <p:spPr>
-          <a:xfrm>
-            <a:off x="381300" y="685800"/>
-            <a:ext cx="6096000" cy="3429000"/>
-          </a:xfrm>
-          <a:custGeom>
-            <a:rect b="b" l="l" r="r" t="t"/>
-            <a:pathLst>
-              <a:path extrusionOk="0" h="120000" w="120000">
-                <a:moveTo>
-                  <a:pt x="0" y="0"/>
-                </a:moveTo>
-                <a:lnTo>
-                  <a:pt x="120000" y="0"/>
-                </a:lnTo>
-                <a:lnTo>
-                  <a:pt x="120000" y="120000"/>
-                </a:lnTo>
-                <a:lnTo>
-                  <a:pt x="0" y="120000"/>
-                </a:lnTo>
-                <a:close/>
-              </a:path>
-            </a:pathLst>
-          </a:custGeom>
-        </p:spPr>
-      </p:sp>
-      <p:sp>
-        <p:nvSpPr>
-          <p:cNvPr id="424" name="Google Shape;424;g2080bffbc39_0_40:notes"/>
-          <p:cNvSpPr txBox="1"/>
-          <p:nvPr>
-            <p:ph idx="1" type="body"/>
-          </p:nvPr>
-        </p:nvSpPr>
-        <p:spPr>
-          <a:xfrm>
-            <a:off x="685800" y="4343400"/>
-            <a:ext cx="5486400" cy="4114800"/>
-          </a:xfrm>
-          <a:prstGeom prst="rect">
-            <a:avLst/>
-          </a:prstGeom>
-        </p:spPr>
-        <p:txBody>
-          <a:bodyPr anchorCtr="0" anchor="t" bIns="91425" lIns="91425" spcFirstLastPara="1" rIns="91425" wrap="square" tIns="91425">
-            <a:noAutofit/>
-          </a:bodyPr>
-          <a:lstStyle/>
-          <a:p>
-            <a:pPr indent="0" lvl="0" marL="0" rtl="0" algn="l">
-              <a:spcBef>
-                <a:spcPts val="0"/>
-              </a:spcBef>
-              <a:spcAft>
-                <a:spcPts val="0"/>
-              </a:spcAft>
-              <a:buNone/>
-            </a:pPr>
-            <a:r>
-              <a:t/>
-            </a:r>
-            <a:endParaRPr/>
-          </a:p>
-        </p:txBody>
-      </p:sp>
-    </p:spTree>
-  </p:cSld>
-  <p:clrMapOvr>
-    <a:masterClrMapping/>
-  </p:clrMapOvr>
-</p:notes>
-</file>
-
-<file path=ppt/notesSlides/notesSlide37.xml><?xml version="1.0" encoding="utf-8"?>
-<p:notes xmlns:a="http://schemas.openxmlformats.org/drawingml/2006/main" xmlns:r="http://schemas.openxmlformats.org/officeDocument/2006/relationships" xmlns:mc="http://schemas.openxmlformats.org/markup-compatibility/2006" xmlns:mv="urn:schemas-microsoft-com:mac:vml" xmlns:p="http://schemas.openxmlformats.org/presentationml/2006/main" xmlns:c="http://schemas.openxmlformats.org/drawingml/2006/chart" xmlns:dgm="http://schemas.openxmlformats.org/drawingml/2006/diagram" xmlns:o="urn:schemas-microsoft-com:office:office" xmlns:v="urn:schemas-microsoft-com:vml" xmlns:pvml="urn:schemas-microsoft-com:office:powerpoint" xmlns:com="http://schemas.openxmlformats.org/drawingml/2006/compatibility" xmlns:p14="http://schemas.microsoft.com/office/powerpoint/2010/main" xmlns:p15="http://schemas.microsoft.com/office/powerpoint/2012/main" xmlns:ahyp="http://schemas.microsoft.com/office/drawing/2018/hyperlinkcolor" showMasterPhAnim="0" showMasterSp="0">
-  <p:cSld>
-    <p:spTree>
-      <p:nvGrpSpPr>
-        <p:cNvPr id="428" name="Shape 428"/>
-        <p:cNvGrpSpPr/>
-        <p:nvPr/>
-      </p:nvGrpSpPr>
-      <p:grpSpPr>
-        <a:xfrm>
-          <a:off x="0" y="0"/>
-          <a:ext cx="0" cy="0"/>
-          <a:chOff x="0" y="0"/>
-          <a:chExt cx="0" cy="0"/>
-        </a:xfrm>
-      </p:grpSpPr>
-      <p:sp>
-        <p:nvSpPr>
-          <p:cNvPr id="429" name="Google Shape;429;g2080bffbc39_0_45:notes"/>
+          <p:cNvPr id="443" name="Google Shape;443;g1b638a6e53b_0_6:notes"/>
           <p:cNvSpPr txBox="1"/>
           <p:nvPr>
             <p:ph idx="1" type="body"/>
@@ -3756,106 +3755,7 @@
       </p:sp>
       <p:sp>
         <p:nvSpPr>
-          <p:cNvPr id="430" name="Google Shape;430;g2080bffbc39_0_45:notes"/>
-          <p:cNvSpPr/>
-          <p:nvPr>
-            <p:ph idx="2" type="sldImg"/>
-          </p:nvPr>
-        </p:nvSpPr>
-        <p:spPr>
-          <a:xfrm>
-            <a:off x="685800" y="1143000"/>
-            <a:ext cx="5486400" cy="3086100"/>
-          </a:xfrm>
-          <a:custGeom>
-            <a:rect b="b" l="l" r="r" t="t"/>
-            <a:pathLst>
-              <a:path extrusionOk="0" h="120000" w="120000">
-                <a:moveTo>
-                  <a:pt x="0" y="0"/>
-                </a:moveTo>
-                <a:lnTo>
-                  <a:pt x="120000" y="0"/>
-                </a:lnTo>
-                <a:lnTo>
-                  <a:pt x="120000" y="120000"/>
-                </a:lnTo>
-                <a:lnTo>
-                  <a:pt x="0" y="120000"/>
-                </a:lnTo>
-                <a:close/>
-              </a:path>
-            </a:pathLst>
-          </a:custGeom>
-        </p:spPr>
-      </p:sp>
-    </p:spTree>
-  </p:cSld>
-  <p:clrMapOvr>
-    <a:masterClrMapping/>
-  </p:clrMapOvr>
-</p:notes>
-</file>
-
-<file path=ppt/notesSlides/notesSlide38.xml><?xml version="1.0" encoding="utf-8"?>
-<p:notes xmlns:a="http://schemas.openxmlformats.org/drawingml/2006/main" xmlns:r="http://schemas.openxmlformats.org/officeDocument/2006/relationships" xmlns:mc="http://schemas.openxmlformats.org/markup-compatibility/2006" xmlns:mv="urn:schemas-microsoft-com:mac:vml" xmlns:p="http://schemas.openxmlformats.org/presentationml/2006/main" xmlns:c="http://schemas.openxmlformats.org/drawingml/2006/chart" xmlns:dgm="http://schemas.openxmlformats.org/drawingml/2006/diagram" xmlns:o="urn:schemas-microsoft-com:office:office" xmlns:v="urn:schemas-microsoft-com:vml" xmlns:pvml="urn:schemas-microsoft-com:office:powerpoint" xmlns:com="http://schemas.openxmlformats.org/drawingml/2006/compatibility" xmlns:p14="http://schemas.microsoft.com/office/powerpoint/2010/main" xmlns:p15="http://schemas.microsoft.com/office/powerpoint/2012/main" xmlns:ahyp="http://schemas.microsoft.com/office/drawing/2018/hyperlinkcolor" showMasterPhAnim="0" showMasterSp="0">
-  <p:cSld>
-    <p:spTree>
-      <p:nvGrpSpPr>
-        <p:cNvPr id="449" name="Shape 449"/>
-        <p:cNvGrpSpPr/>
-        <p:nvPr/>
-      </p:nvGrpSpPr>
-      <p:grpSpPr>
-        <a:xfrm>
-          <a:off x="0" y="0"/>
-          <a:ext cx="0" cy="0"/>
-          <a:chOff x="0" y="0"/>
-          <a:chExt cx="0" cy="0"/>
-        </a:xfrm>
-      </p:grpSpPr>
-      <p:sp>
-        <p:nvSpPr>
-          <p:cNvPr id="450" name="Google Shape;450;g1b638a6e53b_0_6:notes"/>
-          <p:cNvSpPr txBox="1"/>
-          <p:nvPr>
-            <p:ph idx="1" type="body"/>
-          </p:nvPr>
-        </p:nvSpPr>
-        <p:spPr>
-          <a:xfrm>
-            <a:off x="685800" y="4400550"/>
-            <a:ext cx="5486400" cy="3600600"/>
-          </a:xfrm>
-          <a:prstGeom prst="rect">
-            <a:avLst/>
-          </a:prstGeom>
-        </p:spPr>
-        <p:txBody>
-          <a:bodyPr anchorCtr="0" anchor="t" bIns="91425" lIns="91425" spcFirstLastPara="1" rIns="91425" wrap="square" tIns="91425">
-            <a:noAutofit/>
-          </a:bodyPr>
-          <a:lstStyle/>
-          <a:p>
-            <a:pPr indent="0" lvl="0" marL="0" rtl="0" algn="l">
-              <a:spcBef>
-                <a:spcPts val="0"/>
-              </a:spcBef>
-              <a:spcAft>
-                <a:spcPts val="0"/>
-              </a:spcAft>
-              <a:buNone/>
-            </a:pPr>
-            <a:r>
-              <a:t/>
-            </a:r>
-            <a:endParaRPr/>
-          </a:p>
-        </p:txBody>
-      </p:sp>
-      <p:sp>
-        <p:nvSpPr>
-          <p:cNvPr id="451" name="Google Shape;451;g1b638a6e53b_0_6:notes"/>
+          <p:cNvPr id="444" name="Google Shape;444;g1b638a6e53b_0_6:notes"/>
           <p:cNvSpPr/>
           <p:nvPr>
             <p:ph idx="2" type="sldImg"/>
@@ -24851,7 +24751,7 @@
             <a:tbl>
               <a:tblPr bandRow="1" firstRow="1">
                 <a:noFill/>
-                <a:tableStyleId>{85D4CEF9-AEDD-45AB-B5C0-CCB259745F1C}</a:tableStyleId>
+                <a:tableStyleId>{1B43DBC7-8D41-4FF6-8546-3C82267E19AC}</a:tableStyleId>
               </a:tblPr>
               <a:tblGrid>
                 <a:gridCol w="1024875"/>
@@ -25529,7 +25429,7 @@
             <a:tbl>
               <a:tblPr bandRow="1" firstRow="1">
                 <a:noFill/>
-                <a:tableStyleId>{85D4CEF9-AEDD-45AB-B5C0-CCB259745F1C}</a:tableStyleId>
+                <a:tableStyleId>{1B43DBC7-8D41-4FF6-8546-3C82267E19AC}</a:tableStyleId>
               </a:tblPr>
               <a:tblGrid>
                 <a:gridCol w="1024875"/>
@@ -27173,7 +27073,7 @@
             <a:tbl>
               <a:tblPr bandRow="1" firstRow="1">
                 <a:noFill/>
-                <a:tableStyleId>{85D4CEF9-AEDD-45AB-B5C0-CCB259745F1C}</a:tableStyleId>
+                <a:tableStyleId>{1B43DBC7-8D41-4FF6-8546-3C82267E19AC}</a:tableStyleId>
               </a:tblPr>
               <a:tblGrid>
                 <a:gridCol w="1024875"/>
@@ -27854,7 +27754,7 @@
             <a:tbl>
               <a:tblPr bandRow="1" firstRow="1">
                 <a:noFill/>
-                <a:tableStyleId>{85D4CEF9-AEDD-45AB-B5C0-CCB259745F1C}</a:tableStyleId>
+                <a:tableStyleId>{1B43DBC7-8D41-4FF6-8546-3C82267E19AC}</a:tableStyleId>
               </a:tblPr>
               <a:tblGrid>
                 <a:gridCol w="1024875"/>
@@ -29114,7 +29014,7 @@
             <a:tbl>
               <a:tblPr bandRow="1" firstRow="1">
                 <a:noFill/>
-                <a:tableStyleId>{85D4CEF9-AEDD-45AB-B5C0-CCB259745F1C}</a:tableStyleId>
+                <a:tableStyleId>{1B43DBC7-8D41-4FF6-8546-3C82267E19AC}</a:tableStyleId>
               </a:tblPr>
               <a:tblGrid>
                 <a:gridCol w="1024875"/>
@@ -29792,7 +29692,7 @@
             <a:tbl>
               <a:tblPr bandRow="1" firstRow="1">
                 <a:noFill/>
-                <a:tableStyleId>{85D4CEF9-AEDD-45AB-B5C0-CCB259745F1C}</a:tableStyleId>
+                <a:tableStyleId>{1B43DBC7-8D41-4FF6-8546-3C82267E19AC}</a:tableStyleId>
               </a:tblPr>
               <a:tblGrid>
                 <a:gridCol w="1024875"/>
@@ -31562,7 +31462,7 @@
             <a:tbl>
               <a:tblPr bandRow="1" firstRow="1">
                 <a:noFill/>
-                <a:tableStyleId>{85D4CEF9-AEDD-45AB-B5C0-CCB259745F1C}</a:tableStyleId>
+                <a:tableStyleId>{1B43DBC7-8D41-4FF6-8546-3C82267E19AC}</a:tableStyleId>
               </a:tblPr>
               <a:tblGrid>
                 <a:gridCol w="1024875"/>
@@ -32240,7 +32140,7 @@
             <a:tbl>
               <a:tblPr bandRow="1" firstRow="1">
                 <a:noFill/>
-                <a:tableStyleId>{85D4CEF9-AEDD-45AB-B5C0-CCB259745F1C}</a:tableStyleId>
+                <a:tableStyleId>{1B43DBC7-8D41-4FF6-8546-3C82267E19AC}</a:tableStyleId>
               </a:tblPr>
               <a:tblGrid>
                 <a:gridCol w="1024875"/>
@@ -33557,7 +33457,7 @@
             <a:tbl>
               <a:tblPr bandRow="1" firstRow="1">
                 <a:noFill/>
-                <a:tableStyleId>{85D4CEF9-AEDD-45AB-B5C0-CCB259745F1C}</a:tableStyleId>
+                <a:tableStyleId>{1B43DBC7-8D41-4FF6-8546-3C82267E19AC}</a:tableStyleId>
               </a:tblPr>
               <a:tblGrid>
                 <a:gridCol w="1680900"/>
@@ -34955,7 +34855,7 @@
             <a:tbl>
               <a:tblPr bandRow="1" firstRow="1">
                 <a:noFill/>
-                <a:tableStyleId>{85D4CEF9-AEDD-45AB-B5C0-CCB259745F1C}</a:tableStyleId>
+                <a:tableStyleId>{1B43DBC7-8D41-4FF6-8546-3C82267E19AC}</a:tableStyleId>
               </a:tblPr>
               <a:tblGrid>
                 <a:gridCol w="1680900"/>
@@ -36404,45 +36304,34 @@
         </p:nvSpPr>
         <p:spPr>
           <a:xfrm>
-            <a:off x="5946370" y="1000126"/>
-            <a:ext cx="2667000" cy="1364456"/>
+            <a:off x="387900" y="1152450"/>
+            <a:ext cx="8368200" cy="1538400"/>
           </a:xfrm>
           <a:prstGeom prst="rect">
             <a:avLst/>
           </a:prstGeom>
-          <a:noFill/>
-          <a:ln>
-            <a:noFill/>
-          </a:ln>
         </p:spPr>
         <p:txBody>
-          <a:bodyPr anchorCtr="0" anchor="b" bIns="34275" lIns="68575" spcFirstLastPara="1" rIns="68575" wrap="square" tIns="34275">
-            <a:normAutofit fontScale="90000"/>
+          <a:bodyPr anchorCtr="0" anchor="ctr" bIns="91425" lIns="91425" spcFirstLastPara="1" rIns="91425" wrap="square" tIns="91425">
+            <a:noAutofit/>
           </a:bodyPr>
           <a:lstStyle/>
           <a:p>
-            <a:pPr indent="0" lvl="0" marL="0" rtl="0" algn="l">
-              <a:lnSpc>
-                <a:spcPct val="90000"/>
-              </a:lnSpc>
-              <a:spcBef>
-                <a:spcPts val="0"/>
-              </a:spcBef>
-              <a:spcAft>
-                <a:spcPts val="0"/>
-              </a:spcAft>
-              <a:buClr>
-                <a:schemeClr val="dk1"/>
-              </a:buClr>
-              <a:buSzPct val="100000"/>
-              <a:buFont typeface="Calibri"/>
+            <a:pPr indent="0" lvl="0" marL="0" rtl="0" algn="ctr">
+              <a:spcBef>
+                <a:spcPts val="0"/>
+              </a:spcBef>
+              <a:spcAft>
+                <a:spcPts val="0"/>
+              </a:spcAft>
+              <a:buSzPts val="990"/>
               <a:buNone/>
             </a:pPr>
             <a:r>
-              <a:rPr lang="en"/>
-              <a:t>Truthy and Falsy</a:t>
-            </a:r>
-            <a:endParaRPr/>
+              <a:rPr lang="en" sz="6600"/>
+              <a:t>Converting Booleans</a:t>
+            </a:r>
+            <a:endParaRPr sz="6600"/>
           </a:p>
         </p:txBody>
       </p:sp>
@@ -36456,74 +36345,36 @@
         </p:nvSpPr>
         <p:spPr>
           <a:xfrm>
-            <a:off x="5977715" y="2239178"/>
-            <a:ext cx="2604310" cy="539741"/>
+            <a:off x="387900" y="2919450"/>
+            <a:ext cx="8368200" cy="1071600"/>
           </a:xfrm>
           <a:prstGeom prst="rect">
             <a:avLst/>
           </a:prstGeom>
-          <a:noFill/>
-          <a:ln>
-            <a:noFill/>
-          </a:ln>
         </p:spPr>
         <p:txBody>
-          <a:bodyPr anchorCtr="0" anchor="t" bIns="34275" lIns="68575" spcFirstLastPara="1" rIns="68575" wrap="square" tIns="34275">
-            <a:normAutofit lnSpcReduction="10000"/>
+          <a:bodyPr anchorCtr="0" anchor="ctr" bIns="91425" lIns="91425" spcFirstLastPara="1" rIns="91425" wrap="square" tIns="91425">
+            <a:normAutofit/>
           </a:bodyPr>
           <a:lstStyle/>
           <a:p>
-            <a:pPr indent="0" lvl="0" marL="0" rtl="0" algn="l">
-              <a:lnSpc>
-                <a:spcPct val="90000"/>
-              </a:lnSpc>
+            <a:pPr indent="0" lvl="0" marL="0" rtl="0" algn="ctr">
               <a:spcBef>
                 <a:spcPts val="0"/>
               </a:spcBef>
               <a:spcAft>
                 <a:spcPts val="1200"/>
               </a:spcAft>
-              <a:buClr>
-                <a:srgbClr val="888888"/>
-              </a:buClr>
-              <a:buSzPts val="1800"/>
               <a:buNone/>
             </a:pPr>
             <a:r>
               <a:rPr lang="en"/>
-              <a:t>Allows for easy navigation</a:t>
+              <a:t>What does python consider True/False</a:t>
             </a:r>
             <a:endParaRPr/>
           </a:p>
         </p:txBody>
       </p:sp>
-      <p:pic>
-        <p:nvPicPr>
-          <p:cNvPr descr="A sign on a brick wall" id="379" name="Google Shape;379;p56"/>
-          <p:cNvPicPr preferRelativeResize="0"/>
-          <p:nvPr/>
-        </p:nvPicPr>
-        <p:blipFill rotWithShape="1">
-          <a:blip r:embed="rId3">
-            <a:alphaModFix/>
-          </a:blip>
-          <a:srcRect b="0" l="0" r="0" t="0"/>
-          <a:stretch/>
-        </p:blipFill>
-        <p:spPr>
-          <a:xfrm>
-            <a:off x="296465" y="1000126"/>
-            <a:ext cx="4988451" cy="3325634"/>
-          </a:xfrm>
-          <a:prstGeom prst="rect">
-            <a:avLst/>
-          </a:prstGeom>
-          <a:noFill/>
-          <a:ln>
-            <a:noFill/>
-          </a:ln>
-        </p:spPr>
-      </p:pic>
     </p:spTree>
   </p:cSld>
   <p:clrMapOvr>
@@ -36819,7 +36670,7 @@
   <p:cSld>
     <p:spTree>
       <p:nvGrpSpPr>
-        <p:cNvPr id="383" name="Shape 383"/>
+        <p:cNvPr id="382" name="Shape 382"/>
         <p:cNvGrpSpPr/>
         <p:nvPr/>
       </p:nvGrpSpPr>
@@ -36833,113 +36684,7 @@
       </p:grpSpPr>
       <p:sp>
         <p:nvSpPr>
-          <p:cNvPr id="384" name="Google Shape;384;p57"/>
-          <p:cNvSpPr txBox="1"/>
-          <p:nvPr>
-            <p:ph type="title"/>
-          </p:nvPr>
-        </p:nvSpPr>
-        <p:spPr>
-          <a:xfrm>
-            <a:off x="387900" y="1152450"/>
-            <a:ext cx="8368200" cy="1538400"/>
-          </a:xfrm>
-          <a:prstGeom prst="rect">
-            <a:avLst/>
-          </a:prstGeom>
-        </p:spPr>
-        <p:txBody>
-          <a:bodyPr anchorCtr="0" anchor="ctr" bIns="91425" lIns="91425" spcFirstLastPara="1" rIns="91425" wrap="square" tIns="91425">
-            <a:noAutofit/>
-          </a:bodyPr>
-          <a:lstStyle/>
-          <a:p>
-            <a:pPr indent="0" lvl="0" marL="0" rtl="0" algn="ctr">
-              <a:spcBef>
-                <a:spcPts val="0"/>
-              </a:spcBef>
-              <a:spcAft>
-                <a:spcPts val="0"/>
-              </a:spcAft>
-              <a:buSzPts val="990"/>
-              <a:buNone/>
-            </a:pPr>
-            <a:r>
-              <a:rPr lang="en" sz="6600"/>
-              <a:t>Converting Booleans</a:t>
-            </a:r>
-            <a:endParaRPr sz="6600"/>
-          </a:p>
-        </p:txBody>
-      </p:sp>
-      <p:sp>
-        <p:nvSpPr>
-          <p:cNvPr id="385" name="Google Shape;385;p57"/>
-          <p:cNvSpPr txBox="1"/>
-          <p:nvPr>
-            <p:ph idx="1" type="body"/>
-          </p:nvPr>
-        </p:nvSpPr>
-        <p:spPr>
-          <a:xfrm>
-            <a:off x="387900" y="2919450"/>
-            <a:ext cx="8368200" cy="1071600"/>
-          </a:xfrm>
-          <a:prstGeom prst="rect">
-            <a:avLst/>
-          </a:prstGeom>
-        </p:spPr>
-        <p:txBody>
-          <a:bodyPr anchorCtr="0" anchor="ctr" bIns="91425" lIns="91425" spcFirstLastPara="1" rIns="91425" wrap="square" tIns="91425">
-            <a:normAutofit/>
-          </a:bodyPr>
-          <a:lstStyle/>
-          <a:p>
-            <a:pPr indent="0" lvl="0" marL="0" rtl="0" algn="ctr">
-              <a:spcBef>
-                <a:spcPts val="0"/>
-              </a:spcBef>
-              <a:spcAft>
-                <a:spcPts val="1200"/>
-              </a:spcAft>
-              <a:buNone/>
-            </a:pPr>
-            <a:r>
-              <a:rPr lang="en"/>
-              <a:t>What does python consider True/False</a:t>
-            </a:r>
-            <a:endParaRPr/>
-          </a:p>
-        </p:txBody>
-      </p:sp>
-    </p:spTree>
-  </p:cSld>
-  <p:clrMapOvr>
-    <a:masterClrMapping/>
-  </p:clrMapOvr>
-</p:sld>
-</file>
-
-<file path=ppt/slides/slide31.xml><?xml version="1.0" encoding="utf-8"?>
-<p:sld xmlns:a="http://schemas.openxmlformats.org/drawingml/2006/main" xmlns:r="http://schemas.openxmlformats.org/officeDocument/2006/relationships" xmlns:mc="http://schemas.openxmlformats.org/markup-compatibility/2006" xmlns:mv="urn:schemas-microsoft-com:mac:vml" xmlns:p="http://schemas.openxmlformats.org/presentationml/2006/main" xmlns:c="http://schemas.openxmlformats.org/drawingml/2006/chart" xmlns:dgm="http://schemas.openxmlformats.org/drawingml/2006/diagram" xmlns:o="urn:schemas-microsoft-com:office:office" xmlns:v="urn:schemas-microsoft-com:vml" xmlns:pvml="urn:schemas-microsoft-com:office:powerpoint" xmlns:com="http://schemas.openxmlformats.org/drawingml/2006/compatibility" xmlns:p14="http://schemas.microsoft.com/office/powerpoint/2010/main" xmlns:p15="http://schemas.microsoft.com/office/powerpoint/2012/main" xmlns:ahyp="http://schemas.microsoft.com/office/drawing/2018/hyperlinkcolor">
-  <p:cSld>
-    <p:spTree>
-      <p:nvGrpSpPr>
-        <p:cNvPr id="389" name="Shape 389"/>
-        <p:cNvGrpSpPr/>
-        <p:nvPr/>
-      </p:nvGrpSpPr>
-      <p:grpSpPr>
-        <a:xfrm>
-          <a:off x="0" y="0"/>
-          <a:ext cx="0" cy="0"/>
-          <a:chOff x="0" y="0"/>
-          <a:chExt cx="0" cy="0"/>
-        </a:xfrm>
-      </p:grpSpPr>
-      <p:sp>
-        <p:nvSpPr>
-          <p:cNvPr id="390" name="Google Shape;390;p58"/>
+          <p:cNvPr id="383" name="Google Shape;383;p57"/>
           <p:cNvSpPr txBox="1"/>
           <p:nvPr>
             <p:ph type="title"/>
@@ -36991,7 +36736,7 @@
       </p:sp>
       <p:sp>
         <p:nvSpPr>
-          <p:cNvPr id="391" name="Google Shape;391;p58"/>
+          <p:cNvPr id="384" name="Google Shape;384;p57"/>
           <p:cNvSpPr txBox="1"/>
           <p:nvPr>
             <p:ph idx="1" type="body"/>
@@ -37181,7 +36926,7 @@
       </p:sp>
       <p:sp>
         <p:nvSpPr>
-          <p:cNvPr id="392" name="Google Shape;392;p58"/>
+          <p:cNvPr id="385" name="Google Shape;385;p57"/>
           <p:cNvSpPr txBox="1"/>
           <p:nvPr/>
         </p:nvSpPr>
@@ -37478,6 +37223,1121 @@
               <a:t>&gt;&gt; True</a:t>
             </a:r>
             <a:endParaRPr sz="1100"/>
+          </a:p>
+        </p:txBody>
+      </p:sp>
+      <p:sp>
+        <p:nvSpPr>
+          <p:cNvPr id="386" name="Google Shape;386;p57"/>
+          <p:cNvSpPr txBox="1"/>
+          <p:nvPr/>
+        </p:nvSpPr>
+        <p:spPr>
+          <a:xfrm>
+            <a:off x="4572000" y="1341775"/>
+            <a:ext cx="2676600" cy="2839800"/>
+          </a:xfrm>
+          <a:prstGeom prst="rect">
+            <a:avLst/>
+          </a:prstGeom>
+          <a:solidFill>
+            <a:schemeClr val="dk1"/>
+          </a:solidFill>
+          <a:ln cap="flat" cmpd="sng" w="19050">
+            <a:solidFill>
+              <a:schemeClr val="dk2"/>
+            </a:solidFill>
+            <a:prstDash val="solid"/>
+            <a:round/>
+            <a:headEnd len="sm" w="sm" type="none"/>
+            <a:tailEnd len="sm" w="sm" type="none"/>
+          </a:ln>
+          <a:effectLst>
+            <a:outerShdw blurRad="57150" rotWithShape="0" algn="bl" dir="5400000" dist="19050">
+              <a:srgbClr val="000000">
+                <a:alpha val="50000"/>
+              </a:srgbClr>
+            </a:outerShdw>
+          </a:effectLst>
+        </p:spPr>
+        <p:txBody>
+          <a:bodyPr anchorCtr="0" anchor="t" bIns="34275" lIns="68575" spcFirstLastPara="1" rIns="68575" wrap="square" tIns="34275">
+            <a:spAutoFit/>
+          </a:bodyPr>
+          <a:lstStyle/>
+          <a:p>
+            <a:pPr indent="0" lvl="0" marL="0" marR="0" rtl="0" algn="l">
+              <a:spcBef>
+                <a:spcPts val="0"/>
+              </a:spcBef>
+              <a:spcAft>
+                <a:spcPts val="0"/>
+              </a:spcAft>
+              <a:buNone/>
+            </a:pPr>
+            <a:r>
+              <a:rPr b="0" lang="en" sz="1800">
+                <a:solidFill>
+                  <a:srgbClr val="795E26"/>
+                </a:solidFill>
+                <a:latin typeface="Consolas"/>
+                <a:ea typeface="Consolas"/>
+                <a:cs typeface="Consolas"/>
+                <a:sym typeface="Consolas"/>
+              </a:rPr>
+              <a:t>print</a:t>
+            </a:r>
+            <a:r>
+              <a:rPr b="0" lang="en" sz="1800">
+                <a:solidFill>
+                  <a:srgbClr val="000000"/>
+                </a:solidFill>
+                <a:latin typeface="Consolas"/>
+                <a:ea typeface="Consolas"/>
+                <a:cs typeface="Consolas"/>
+                <a:sym typeface="Consolas"/>
+              </a:rPr>
+              <a:t>(</a:t>
+            </a:r>
+            <a:r>
+              <a:rPr b="0" lang="en" sz="1800">
+                <a:solidFill>
+                  <a:srgbClr val="267F99"/>
+                </a:solidFill>
+                <a:latin typeface="Consolas"/>
+                <a:ea typeface="Consolas"/>
+                <a:cs typeface="Consolas"/>
+                <a:sym typeface="Consolas"/>
+              </a:rPr>
+              <a:t>bool</a:t>
+            </a:r>
+            <a:r>
+              <a:rPr b="0" lang="en" sz="1800">
+                <a:solidFill>
+                  <a:srgbClr val="000000"/>
+                </a:solidFill>
+                <a:latin typeface="Consolas"/>
+                <a:ea typeface="Consolas"/>
+                <a:cs typeface="Consolas"/>
+                <a:sym typeface="Consolas"/>
+              </a:rPr>
+              <a:t>(</a:t>
+            </a:r>
+            <a:r>
+              <a:rPr b="0" lang="en" sz="1800">
+                <a:solidFill>
+                  <a:srgbClr val="098658"/>
+                </a:solidFill>
+                <a:latin typeface="Consolas"/>
+                <a:ea typeface="Consolas"/>
+                <a:cs typeface="Consolas"/>
+                <a:sym typeface="Consolas"/>
+              </a:rPr>
+              <a:t>0</a:t>
+            </a:r>
+            <a:r>
+              <a:rPr b="0" lang="en" sz="1800">
+                <a:solidFill>
+                  <a:srgbClr val="000000"/>
+                </a:solidFill>
+                <a:latin typeface="Consolas"/>
+                <a:ea typeface="Consolas"/>
+                <a:cs typeface="Consolas"/>
+                <a:sym typeface="Consolas"/>
+              </a:rPr>
+              <a:t>))</a:t>
+            </a:r>
+            <a:endParaRPr sz="1100"/>
+          </a:p>
+          <a:p>
+            <a:pPr indent="0" lvl="0" marL="0" marR="0" rtl="0" algn="l">
+              <a:spcBef>
+                <a:spcPts val="0"/>
+              </a:spcBef>
+              <a:spcAft>
+                <a:spcPts val="0"/>
+              </a:spcAft>
+              <a:buNone/>
+            </a:pPr>
+            <a:r>
+              <a:rPr b="0" lang="en" sz="1800">
+                <a:solidFill>
+                  <a:srgbClr val="795E26"/>
+                </a:solidFill>
+                <a:latin typeface="Consolas"/>
+                <a:ea typeface="Consolas"/>
+                <a:cs typeface="Consolas"/>
+                <a:sym typeface="Consolas"/>
+              </a:rPr>
+              <a:t>print</a:t>
+            </a:r>
+            <a:r>
+              <a:rPr b="0" lang="en" sz="1800">
+                <a:solidFill>
+                  <a:srgbClr val="000000"/>
+                </a:solidFill>
+                <a:latin typeface="Consolas"/>
+                <a:ea typeface="Consolas"/>
+                <a:cs typeface="Consolas"/>
+                <a:sym typeface="Consolas"/>
+              </a:rPr>
+              <a:t>(</a:t>
+            </a:r>
+            <a:r>
+              <a:rPr b="0" lang="en" sz="1800">
+                <a:solidFill>
+                  <a:srgbClr val="267F99"/>
+                </a:solidFill>
+                <a:latin typeface="Consolas"/>
+                <a:ea typeface="Consolas"/>
+                <a:cs typeface="Consolas"/>
+                <a:sym typeface="Consolas"/>
+              </a:rPr>
+              <a:t>bool</a:t>
+            </a:r>
+            <a:r>
+              <a:rPr b="0" lang="en" sz="1800">
+                <a:solidFill>
+                  <a:srgbClr val="000000"/>
+                </a:solidFill>
+                <a:latin typeface="Consolas"/>
+                <a:ea typeface="Consolas"/>
+                <a:cs typeface="Consolas"/>
+                <a:sym typeface="Consolas"/>
+              </a:rPr>
+              <a:t>(</a:t>
+            </a:r>
+            <a:r>
+              <a:rPr b="0" lang="en" sz="1800">
+                <a:solidFill>
+                  <a:srgbClr val="098658"/>
+                </a:solidFill>
+                <a:latin typeface="Consolas"/>
+                <a:ea typeface="Consolas"/>
+                <a:cs typeface="Consolas"/>
+                <a:sym typeface="Consolas"/>
+              </a:rPr>
+              <a:t>0.0</a:t>
+            </a:r>
+            <a:r>
+              <a:rPr b="0" lang="en" sz="1800">
+                <a:solidFill>
+                  <a:srgbClr val="000000"/>
+                </a:solidFill>
+                <a:latin typeface="Consolas"/>
+                <a:ea typeface="Consolas"/>
+                <a:cs typeface="Consolas"/>
+                <a:sym typeface="Consolas"/>
+              </a:rPr>
+              <a:t>))</a:t>
+            </a:r>
+            <a:endParaRPr sz="1100"/>
+          </a:p>
+          <a:p>
+            <a:pPr indent="0" lvl="0" marL="0" marR="0" rtl="0" algn="l">
+              <a:spcBef>
+                <a:spcPts val="0"/>
+              </a:spcBef>
+              <a:spcAft>
+                <a:spcPts val="0"/>
+              </a:spcAft>
+              <a:buNone/>
+            </a:pPr>
+            <a:r>
+              <a:rPr b="0" lang="en" sz="1800">
+                <a:solidFill>
+                  <a:srgbClr val="795E26"/>
+                </a:solidFill>
+                <a:latin typeface="Consolas"/>
+                <a:ea typeface="Consolas"/>
+                <a:cs typeface="Consolas"/>
+                <a:sym typeface="Consolas"/>
+              </a:rPr>
+              <a:t>print</a:t>
+            </a:r>
+            <a:r>
+              <a:rPr b="0" lang="en" sz="1800">
+                <a:solidFill>
+                  <a:srgbClr val="000000"/>
+                </a:solidFill>
+                <a:latin typeface="Consolas"/>
+                <a:ea typeface="Consolas"/>
+                <a:cs typeface="Consolas"/>
+                <a:sym typeface="Consolas"/>
+              </a:rPr>
+              <a:t>(</a:t>
+            </a:r>
+            <a:r>
+              <a:rPr b="0" lang="en" sz="1800">
+                <a:solidFill>
+                  <a:srgbClr val="267F99"/>
+                </a:solidFill>
+                <a:latin typeface="Consolas"/>
+                <a:ea typeface="Consolas"/>
+                <a:cs typeface="Consolas"/>
+                <a:sym typeface="Consolas"/>
+              </a:rPr>
+              <a:t>bool</a:t>
+            </a:r>
+            <a:r>
+              <a:rPr b="0" lang="en" sz="1800">
+                <a:solidFill>
+                  <a:srgbClr val="000000"/>
+                </a:solidFill>
+                <a:latin typeface="Consolas"/>
+                <a:ea typeface="Consolas"/>
+                <a:cs typeface="Consolas"/>
+                <a:sym typeface="Consolas"/>
+              </a:rPr>
+              <a:t>(</a:t>
+            </a:r>
+            <a:r>
+              <a:rPr b="0" lang="en" sz="1800">
+                <a:solidFill>
+                  <a:srgbClr val="A31515"/>
+                </a:solidFill>
+                <a:latin typeface="Consolas"/>
+                <a:ea typeface="Consolas"/>
+                <a:cs typeface="Consolas"/>
+                <a:sym typeface="Consolas"/>
+              </a:rPr>
+              <a:t>''</a:t>
+            </a:r>
+            <a:r>
+              <a:rPr b="0" lang="en" sz="1800">
+                <a:solidFill>
+                  <a:srgbClr val="000000"/>
+                </a:solidFill>
+                <a:latin typeface="Consolas"/>
+                <a:ea typeface="Consolas"/>
+                <a:cs typeface="Consolas"/>
+                <a:sym typeface="Consolas"/>
+              </a:rPr>
+              <a:t>))</a:t>
+            </a:r>
+            <a:endParaRPr sz="1100"/>
+          </a:p>
+          <a:p>
+            <a:pPr indent="0" lvl="0" marL="0" marR="0" rtl="0" algn="l">
+              <a:spcBef>
+                <a:spcPts val="0"/>
+              </a:spcBef>
+              <a:spcAft>
+                <a:spcPts val="0"/>
+              </a:spcAft>
+              <a:buNone/>
+            </a:pPr>
+            <a:r>
+              <a:rPr b="0" lang="en" sz="1800">
+                <a:solidFill>
+                  <a:srgbClr val="795E26"/>
+                </a:solidFill>
+                <a:latin typeface="Consolas"/>
+                <a:ea typeface="Consolas"/>
+                <a:cs typeface="Consolas"/>
+                <a:sym typeface="Consolas"/>
+              </a:rPr>
+              <a:t>print</a:t>
+            </a:r>
+            <a:r>
+              <a:rPr b="0" lang="en" sz="1800">
+                <a:solidFill>
+                  <a:srgbClr val="000000"/>
+                </a:solidFill>
+                <a:latin typeface="Consolas"/>
+                <a:ea typeface="Consolas"/>
+                <a:cs typeface="Consolas"/>
+                <a:sym typeface="Consolas"/>
+              </a:rPr>
+              <a:t>(</a:t>
+            </a:r>
+            <a:r>
+              <a:rPr b="0" lang="en" sz="1800">
+                <a:solidFill>
+                  <a:srgbClr val="267F99"/>
+                </a:solidFill>
+                <a:latin typeface="Consolas"/>
+                <a:ea typeface="Consolas"/>
+                <a:cs typeface="Consolas"/>
+                <a:sym typeface="Consolas"/>
+              </a:rPr>
+              <a:t>bool</a:t>
+            </a:r>
+            <a:r>
+              <a:rPr b="0" lang="en" sz="1800">
+                <a:solidFill>
+                  <a:srgbClr val="000000"/>
+                </a:solidFill>
+                <a:latin typeface="Consolas"/>
+                <a:ea typeface="Consolas"/>
+                <a:cs typeface="Consolas"/>
+                <a:sym typeface="Consolas"/>
+              </a:rPr>
+              <a:t>(</a:t>
+            </a:r>
+            <a:r>
+              <a:rPr b="0" lang="en" sz="1800">
+                <a:solidFill>
+                  <a:srgbClr val="0000FF"/>
+                </a:solidFill>
+                <a:latin typeface="Consolas"/>
+                <a:ea typeface="Consolas"/>
+                <a:cs typeface="Consolas"/>
+                <a:sym typeface="Consolas"/>
+              </a:rPr>
+              <a:t>False</a:t>
+            </a:r>
+            <a:r>
+              <a:rPr b="0" lang="en" sz="1800">
+                <a:solidFill>
+                  <a:srgbClr val="000000"/>
+                </a:solidFill>
+                <a:latin typeface="Consolas"/>
+                <a:ea typeface="Consolas"/>
+                <a:cs typeface="Consolas"/>
+                <a:sym typeface="Consolas"/>
+              </a:rPr>
+              <a:t>))</a:t>
+            </a:r>
+            <a:endParaRPr sz="1100"/>
+          </a:p>
+          <a:p>
+            <a:pPr indent="0" lvl="0" marL="0" marR="0" rtl="0" algn="l">
+              <a:spcBef>
+                <a:spcPts val="0"/>
+              </a:spcBef>
+              <a:spcAft>
+                <a:spcPts val="0"/>
+              </a:spcAft>
+              <a:buNone/>
+            </a:pPr>
+            <a:r>
+              <a:rPr b="0" lang="en" sz="1800">
+                <a:solidFill>
+                  <a:srgbClr val="795E26"/>
+                </a:solidFill>
+                <a:latin typeface="Consolas"/>
+                <a:ea typeface="Consolas"/>
+                <a:cs typeface="Consolas"/>
+                <a:sym typeface="Consolas"/>
+              </a:rPr>
+              <a:t>print</a:t>
+            </a:r>
+            <a:r>
+              <a:rPr b="0" lang="en" sz="1800">
+                <a:solidFill>
+                  <a:srgbClr val="000000"/>
+                </a:solidFill>
+                <a:latin typeface="Consolas"/>
+                <a:ea typeface="Consolas"/>
+                <a:cs typeface="Consolas"/>
+                <a:sym typeface="Consolas"/>
+              </a:rPr>
+              <a:t>(</a:t>
+            </a:r>
+            <a:r>
+              <a:rPr b="0" lang="en" sz="1800">
+                <a:solidFill>
+                  <a:srgbClr val="267F99"/>
+                </a:solidFill>
+                <a:latin typeface="Consolas"/>
+                <a:ea typeface="Consolas"/>
+                <a:cs typeface="Consolas"/>
+                <a:sym typeface="Consolas"/>
+              </a:rPr>
+              <a:t>bool</a:t>
+            </a:r>
+            <a:r>
+              <a:rPr b="0" lang="en" sz="1800">
+                <a:solidFill>
+                  <a:srgbClr val="000000"/>
+                </a:solidFill>
+                <a:latin typeface="Consolas"/>
+                <a:ea typeface="Consolas"/>
+                <a:cs typeface="Consolas"/>
+                <a:sym typeface="Consolas"/>
+              </a:rPr>
+              <a:t>(</a:t>
+            </a:r>
+            <a:r>
+              <a:rPr b="0" lang="en" sz="1800">
+                <a:solidFill>
+                  <a:srgbClr val="0000FF"/>
+                </a:solidFill>
+                <a:latin typeface="Consolas"/>
+                <a:ea typeface="Consolas"/>
+                <a:cs typeface="Consolas"/>
+                <a:sym typeface="Consolas"/>
+              </a:rPr>
+              <a:t>None</a:t>
+            </a:r>
+            <a:r>
+              <a:rPr b="0" lang="en" sz="1800">
+                <a:solidFill>
+                  <a:srgbClr val="000000"/>
+                </a:solidFill>
+                <a:latin typeface="Consolas"/>
+                <a:ea typeface="Consolas"/>
+                <a:cs typeface="Consolas"/>
+                <a:sym typeface="Consolas"/>
+              </a:rPr>
+              <a:t>))</a:t>
+            </a:r>
+            <a:endParaRPr sz="1100"/>
+          </a:p>
+          <a:p>
+            <a:pPr indent="0" lvl="0" marL="0" marR="0" rtl="0" algn="l">
+              <a:spcBef>
+                <a:spcPts val="0"/>
+              </a:spcBef>
+              <a:spcAft>
+                <a:spcPts val="0"/>
+              </a:spcAft>
+              <a:buNone/>
+            </a:pPr>
+            <a:r>
+              <a:t/>
+            </a:r>
+            <a:endParaRPr b="0" sz="1800">
+              <a:solidFill>
+                <a:srgbClr val="795E26"/>
+              </a:solidFill>
+              <a:latin typeface="Consolas"/>
+              <a:ea typeface="Consolas"/>
+              <a:cs typeface="Consolas"/>
+              <a:sym typeface="Consolas"/>
+            </a:endParaRPr>
+          </a:p>
+          <a:p>
+            <a:pPr indent="0" lvl="0" marL="0" marR="0" rtl="0" algn="l">
+              <a:spcBef>
+                <a:spcPts val="0"/>
+              </a:spcBef>
+              <a:spcAft>
+                <a:spcPts val="0"/>
+              </a:spcAft>
+              <a:buNone/>
+            </a:pPr>
+            <a:r>
+              <a:rPr b="0" lang="en" sz="1800">
+                <a:solidFill>
+                  <a:srgbClr val="795E26"/>
+                </a:solidFill>
+                <a:latin typeface="Consolas"/>
+                <a:ea typeface="Consolas"/>
+                <a:cs typeface="Consolas"/>
+                <a:sym typeface="Consolas"/>
+              </a:rPr>
+              <a:t>print</a:t>
+            </a:r>
+            <a:r>
+              <a:rPr b="0" lang="en" sz="1800">
+                <a:solidFill>
+                  <a:srgbClr val="000000"/>
+                </a:solidFill>
+                <a:latin typeface="Consolas"/>
+                <a:ea typeface="Consolas"/>
+                <a:cs typeface="Consolas"/>
+                <a:sym typeface="Consolas"/>
+              </a:rPr>
+              <a:t>(</a:t>
+            </a:r>
+            <a:r>
+              <a:rPr b="0" lang="en" sz="1800">
+                <a:solidFill>
+                  <a:srgbClr val="267F99"/>
+                </a:solidFill>
+                <a:latin typeface="Consolas"/>
+                <a:ea typeface="Consolas"/>
+                <a:cs typeface="Consolas"/>
+                <a:sym typeface="Consolas"/>
+              </a:rPr>
+              <a:t>bool</a:t>
+            </a:r>
+            <a:r>
+              <a:rPr b="0" lang="en" sz="1800">
+                <a:solidFill>
+                  <a:srgbClr val="000000"/>
+                </a:solidFill>
+                <a:latin typeface="Consolas"/>
+                <a:ea typeface="Consolas"/>
+                <a:cs typeface="Consolas"/>
+                <a:sym typeface="Consolas"/>
+              </a:rPr>
+              <a:t>(</a:t>
+            </a:r>
+            <a:r>
+              <a:rPr b="0" lang="en" sz="1800">
+                <a:solidFill>
+                  <a:srgbClr val="098658"/>
+                </a:solidFill>
+                <a:latin typeface="Consolas"/>
+                <a:ea typeface="Consolas"/>
+                <a:cs typeface="Consolas"/>
+                <a:sym typeface="Consolas"/>
+              </a:rPr>
+              <a:t>1</a:t>
+            </a:r>
+            <a:r>
+              <a:rPr b="0" lang="en" sz="1800">
+                <a:solidFill>
+                  <a:srgbClr val="000000"/>
+                </a:solidFill>
+                <a:latin typeface="Consolas"/>
+                <a:ea typeface="Consolas"/>
+                <a:cs typeface="Consolas"/>
+                <a:sym typeface="Consolas"/>
+              </a:rPr>
+              <a:t>))</a:t>
+            </a:r>
+            <a:endParaRPr sz="1100"/>
+          </a:p>
+          <a:p>
+            <a:pPr indent="0" lvl="0" marL="0" marR="0" rtl="0" algn="l">
+              <a:spcBef>
+                <a:spcPts val="0"/>
+              </a:spcBef>
+              <a:spcAft>
+                <a:spcPts val="0"/>
+              </a:spcAft>
+              <a:buNone/>
+            </a:pPr>
+            <a:r>
+              <a:rPr b="0" lang="en" sz="1800">
+                <a:solidFill>
+                  <a:srgbClr val="795E26"/>
+                </a:solidFill>
+                <a:latin typeface="Consolas"/>
+                <a:ea typeface="Consolas"/>
+                <a:cs typeface="Consolas"/>
+                <a:sym typeface="Consolas"/>
+              </a:rPr>
+              <a:t>print</a:t>
+            </a:r>
+            <a:r>
+              <a:rPr b="0" lang="en" sz="1800">
+                <a:solidFill>
+                  <a:srgbClr val="000000"/>
+                </a:solidFill>
+                <a:latin typeface="Consolas"/>
+                <a:ea typeface="Consolas"/>
+                <a:cs typeface="Consolas"/>
+                <a:sym typeface="Consolas"/>
+              </a:rPr>
+              <a:t>(</a:t>
+            </a:r>
+            <a:r>
+              <a:rPr b="0" lang="en" sz="1800">
+                <a:solidFill>
+                  <a:srgbClr val="267F99"/>
+                </a:solidFill>
+                <a:latin typeface="Consolas"/>
+                <a:ea typeface="Consolas"/>
+                <a:cs typeface="Consolas"/>
+                <a:sym typeface="Consolas"/>
+              </a:rPr>
+              <a:t>bool</a:t>
+            </a:r>
+            <a:r>
+              <a:rPr b="0" lang="en" sz="1800">
+                <a:solidFill>
+                  <a:srgbClr val="000000"/>
+                </a:solidFill>
+                <a:latin typeface="Consolas"/>
+                <a:ea typeface="Consolas"/>
+                <a:cs typeface="Consolas"/>
+                <a:sym typeface="Consolas"/>
+              </a:rPr>
+              <a:t>(</a:t>
+            </a:r>
+            <a:r>
+              <a:rPr b="0" lang="en" sz="1800">
+                <a:solidFill>
+                  <a:srgbClr val="098658"/>
+                </a:solidFill>
+                <a:latin typeface="Consolas"/>
+                <a:ea typeface="Consolas"/>
+                <a:cs typeface="Consolas"/>
+                <a:sym typeface="Consolas"/>
+              </a:rPr>
+              <a:t>0.1</a:t>
+            </a:r>
+            <a:r>
+              <a:rPr b="0" lang="en" sz="1800">
+                <a:solidFill>
+                  <a:srgbClr val="000000"/>
+                </a:solidFill>
+                <a:latin typeface="Consolas"/>
+                <a:ea typeface="Consolas"/>
+                <a:cs typeface="Consolas"/>
+                <a:sym typeface="Consolas"/>
+              </a:rPr>
+              <a:t>))</a:t>
+            </a:r>
+            <a:endParaRPr sz="1100"/>
+          </a:p>
+          <a:p>
+            <a:pPr indent="0" lvl="0" marL="0" marR="0" rtl="0" algn="l">
+              <a:spcBef>
+                <a:spcPts val="0"/>
+              </a:spcBef>
+              <a:spcAft>
+                <a:spcPts val="0"/>
+              </a:spcAft>
+              <a:buNone/>
+            </a:pPr>
+            <a:r>
+              <a:rPr b="0" lang="en" sz="1800">
+                <a:solidFill>
+                  <a:srgbClr val="795E26"/>
+                </a:solidFill>
+                <a:latin typeface="Consolas"/>
+                <a:ea typeface="Consolas"/>
+                <a:cs typeface="Consolas"/>
+                <a:sym typeface="Consolas"/>
+              </a:rPr>
+              <a:t>print</a:t>
+            </a:r>
+            <a:r>
+              <a:rPr b="0" lang="en" sz="1800">
+                <a:solidFill>
+                  <a:srgbClr val="000000"/>
+                </a:solidFill>
+                <a:latin typeface="Consolas"/>
+                <a:ea typeface="Consolas"/>
+                <a:cs typeface="Consolas"/>
+                <a:sym typeface="Consolas"/>
+              </a:rPr>
+              <a:t>(</a:t>
+            </a:r>
+            <a:r>
+              <a:rPr b="0" lang="en" sz="1800">
+                <a:solidFill>
+                  <a:srgbClr val="267F99"/>
+                </a:solidFill>
+                <a:latin typeface="Consolas"/>
+                <a:ea typeface="Consolas"/>
+                <a:cs typeface="Consolas"/>
+                <a:sym typeface="Consolas"/>
+              </a:rPr>
+              <a:t>bool</a:t>
+            </a:r>
+            <a:r>
+              <a:rPr b="0" lang="en" sz="1800">
+                <a:solidFill>
+                  <a:srgbClr val="000000"/>
+                </a:solidFill>
+                <a:latin typeface="Consolas"/>
+                <a:ea typeface="Consolas"/>
+                <a:cs typeface="Consolas"/>
+                <a:sym typeface="Consolas"/>
+              </a:rPr>
+              <a:t>(</a:t>
+            </a:r>
+            <a:r>
+              <a:rPr b="0" lang="en" sz="1800">
+                <a:solidFill>
+                  <a:srgbClr val="A31515"/>
+                </a:solidFill>
+                <a:latin typeface="Consolas"/>
+                <a:ea typeface="Consolas"/>
+                <a:cs typeface="Consolas"/>
+                <a:sym typeface="Consolas"/>
+              </a:rPr>
+              <a:t>'Hi'</a:t>
+            </a:r>
+            <a:r>
+              <a:rPr b="0" lang="en" sz="1800">
+                <a:solidFill>
+                  <a:srgbClr val="000000"/>
+                </a:solidFill>
+                <a:latin typeface="Consolas"/>
+                <a:ea typeface="Consolas"/>
+                <a:cs typeface="Consolas"/>
+                <a:sym typeface="Consolas"/>
+              </a:rPr>
+              <a:t>))</a:t>
+            </a:r>
+            <a:endParaRPr sz="1100"/>
+          </a:p>
+          <a:p>
+            <a:pPr indent="0" lvl="0" marL="0" marR="0" rtl="0" algn="l">
+              <a:spcBef>
+                <a:spcPts val="0"/>
+              </a:spcBef>
+              <a:spcAft>
+                <a:spcPts val="0"/>
+              </a:spcAft>
+              <a:buNone/>
+            </a:pPr>
+            <a:r>
+              <a:rPr b="0" lang="en" sz="1800">
+                <a:solidFill>
+                  <a:srgbClr val="795E26"/>
+                </a:solidFill>
+                <a:latin typeface="Consolas"/>
+                <a:ea typeface="Consolas"/>
+                <a:cs typeface="Consolas"/>
+                <a:sym typeface="Consolas"/>
+              </a:rPr>
+              <a:t>print</a:t>
+            </a:r>
+            <a:r>
+              <a:rPr b="0" lang="en" sz="1800">
+                <a:solidFill>
+                  <a:srgbClr val="000000"/>
+                </a:solidFill>
+                <a:latin typeface="Consolas"/>
+                <a:ea typeface="Consolas"/>
+                <a:cs typeface="Consolas"/>
+                <a:sym typeface="Consolas"/>
+              </a:rPr>
+              <a:t>(</a:t>
+            </a:r>
+            <a:r>
+              <a:rPr b="0" lang="en" sz="1800">
+                <a:solidFill>
+                  <a:srgbClr val="267F99"/>
+                </a:solidFill>
+                <a:latin typeface="Consolas"/>
+                <a:ea typeface="Consolas"/>
+                <a:cs typeface="Consolas"/>
+                <a:sym typeface="Consolas"/>
+              </a:rPr>
+              <a:t>bool</a:t>
+            </a:r>
+            <a:r>
+              <a:rPr b="0" lang="en" sz="1800">
+                <a:solidFill>
+                  <a:srgbClr val="000000"/>
+                </a:solidFill>
+                <a:latin typeface="Consolas"/>
+                <a:ea typeface="Consolas"/>
+                <a:cs typeface="Consolas"/>
+                <a:sym typeface="Consolas"/>
+              </a:rPr>
+              <a:t>(</a:t>
+            </a:r>
+            <a:r>
+              <a:rPr b="0" lang="en" sz="1800">
+                <a:solidFill>
+                  <a:srgbClr val="0000FF"/>
+                </a:solidFill>
+                <a:latin typeface="Consolas"/>
+                <a:ea typeface="Consolas"/>
+                <a:cs typeface="Consolas"/>
+                <a:sym typeface="Consolas"/>
+              </a:rPr>
+              <a:t>True</a:t>
+            </a:r>
+            <a:r>
+              <a:rPr b="0" lang="en" sz="1800">
+                <a:solidFill>
+                  <a:srgbClr val="000000"/>
+                </a:solidFill>
+                <a:latin typeface="Consolas"/>
+                <a:ea typeface="Consolas"/>
+                <a:cs typeface="Consolas"/>
+                <a:sym typeface="Consolas"/>
+              </a:rPr>
+              <a:t>))</a:t>
+            </a:r>
+            <a:endParaRPr sz="1100"/>
+          </a:p>
+        </p:txBody>
+      </p:sp>
+    </p:spTree>
+  </p:cSld>
+  <p:clrMapOvr>
+    <a:masterClrMapping/>
+  </p:clrMapOvr>
+</p:sld>
+</file>
+
+<file path=ppt/slides/slide31.xml><?xml version="1.0" encoding="utf-8"?>
+<p:sld xmlns:a="http://schemas.openxmlformats.org/drawingml/2006/main" xmlns:r="http://schemas.openxmlformats.org/officeDocument/2006/relationships" xmlns:mc="http://schemas.openxmlformats.org/markup-compatibility/2006" xmlns:mv="urn:schemas-microsoft-com:mac:vml" xmlns:p="http://schemas.openxmlformats.org/presentationml/2006/main" xmlns:c="http://schemas.openxmlformats.org/drawingml/2006/chart" xmlns:dgm="http://schemas.openxmlformats.org/drawingml/2006/diagram" xmlns:o="urn:schemas-microsoft-com:office:office" xmlns:v="urn:schemas-microsoft-com:vml" xmlns:pvml="urn:schemas-microsoft-com:office:powerpoint" xmlns:com="http://schemas.openxmlformats.org/drawingml/2006/compatibility" xmlns:p14="http://schemas.microsoft.com/office/powerpoint/2010/main" xmlns:p15="http://schemas.microsoft.com/office/powerpoint/2012/main" xmlns:ahyp="http://schemas.microsoft.com/office/drawing/2018/hyperlinkcolor">
+  <p:cSld>
+    <p:spTree>
+      <p:nvGrpSpPr>
+        <p:cNvPr id="390" name="Shape 390"/>
+        <p:cNvGrpSpPr/>
+        <p:nvPr/>
+      </p:nvGrpSpPr>
+      <p:grpSpPr>
+        <a:xfrm>
+          <a:off x="0" y="0"/>
+          <a:ext cx="0" cy="0"/>
+          <a:chOff x="0" y="0"/>
+          <a:chExt cx="0" cy="0"/>
+        </a:xfrm>
+      </p:grpSpPr>
+      <p:sp>
+        <p:nvSpPr>
+          <p:cNvPr id="391" name="Google Shape;391;p58"/>
+          <p:cNvSpPr txBox="1"/>
+          <p:nvPr>
+            <p:ph type="title"/>
+          </p:nvPr>
+        </p:nvSpPr>
+        <p:spPr>
+          <a:xfrm>
+            <a:off x="387900" y="239600"/>
+            <a:ext cx="8368200" cy="686100"/>
+          </a:xfrm>
+          <a:prstGeom prst="rect">
+            <a:avLst/>
+          </a:prstGeom>
+          <a:noFill/>
+          <a:ln>
+            <a:noFill/>
+          </a:ln>
+        </p:spPr>
+        <p:txBody>
+          <a:bodyPr anchorCtr="0" anchor="ctr" bIns="34275" lIns="68575" spcFirstLastPara="1" rIns="68575" wrap="square" tIns="34275">
+            <a:normAutofit/>
+          </a:bodyPr>
+          <a:lstStyle/>
+          <a:p>
+            <a:pPr indent="0" lvl="0" marL="0" rtl="0" algn="l">
+              <a:lnSpc>
+                <a:spcPct val="90000"/>
+              </a:lnSpc>
+              <a:spcBef>
+                <a:spcPts val="0"/>
+              </a:spcBef>
+              <a:spcAft>
+                <a:spcPts val="0"/>
+              </a:spcAft>
+              <a:buClr>
+                <a:schemeClr val="dk1"/>
+              </a:buClr>
+              <a:buSzPts val="3300"/>
+              <a:buFont typeface="Calibri"/>
+              <a:buNone/>
+            </a:pPr>
+            <a:r>
+              <a:rPr lang="en"/>
+              <a:t>Casting to a bool</a:t>
+            </a:r>
+            <a:endParaRPr/>
+          </a:p>
+        </p:txBody>
+      </p:sp>
+      <p:sp>
+        <p:nvSpPr>
+          <p:cNvPr id="392" name="Google Shape;392;p58"/>
+          <p:cNvSpPr txBox="1"/>
+          <p:nvPr>
+            <p:ph idx="1" type="body"/>
+          </p:nvPr>
+        </p:nvSpPr>
+        <p:spPr>
+          <a:xfrm>
+            <a:off x="387900" y="1116950"/>
+            <a:ext cx="4184100" cy="3787500"/>
+          </a:xfrm>
+          <a:prstGeom prst="rect">
+            <a:avLst/>
+          </a:prstGeom>
+          <a:noFill/>
+          <a:ln>
+            <a:noFill/>
+          </a:ln>
+        </p:spPr>
+        <p:txBody>
+          <a:bodyPr anchorCtr="0" anchor="t" bIns="34275" lIns="68575" spcFirstLastPara="1" rIns="68575" wrap="square" tIns="34275">
+            <a:noAutofit/>
+          </a:bodyPr>
+          <a:lstStyle/>
+          <a:p>
+            <a:pPr indent="0" lvl="0" marL="0" rtl="0" algn="l">
+              <a:lnSpc>
+                <a:spcPct val="90000"/>
+              </a:lnSpc>
+              <a:spcBef>
+                <a:spcPts val="0"/>
+              </a:spcBef>
+              <a:spcAft>
+                <a:spcPts val="0"/>
+              </a:spcAft>
+              <a:buClr>
+                <a:schemeClr val="dk1"/>
+              </a:buClr>
+              <a:buSzPts val="2400"/>
+              <a:buNone/>
+            </a:pPr>
+            <a:r>
+              <a:rPr lang="en" sz="2000"/>
+              <a:t>Values that are False when casted to Boolean are </a:t>
+            </a:r>
+            <a:r>
+              <a:rPr b="1" lang="en" sz="2000">
+                <a:solidFill>
+                  <a:schemeClr val="accent6"/>
+                </a:solidFill>
+              </a:rPr>
+              <a:t>falsy</a:t>
+            </a:r>
+            <a:endParaRPr b="1" sz="2000">
+              <a:solidFill>
+                <a:schemeClr val="accent6"/>
+              </a:solidFill>
+            </a:endParaRPr>
+          </a:p>
+          <a:p>
+            <a:pPr indent="0" lvl="0" marL="0" rtl="0" algn="l">
+              <a:lnSpc>
+                <a:spcPct val="90000"/>
+              </a:lnSpc>
+              <a:spcBef>
+                <a:spcPts val="800"/>
+              </a:spcBef>
+              <a:spcAft>
+                <a:spcPts val="0"/>
+              </a:spcAft>
+              <a:buClr>
+                <a:schemeClr val="dk1"/>
+              </a:buClr>
+              <a:buSzPts val="2400"/>
+              <a:buNone/>
+            </a:pPr>
+            <a:r>
+              <a:t/>
+            </a:r>
+            <a:endParaRPr sz="2000"/>
+          </a:p>
+          <a:p>
+            <a:pPr indent="0" lvl="0" marL="0" rtl="0" algn="l">
+              <a:lnSpc>
+                <a:spcPct val="90000"/>
+              </a:lnSpc>
+              <a:spcBef>
+                <a:spcPts val="800"/>
+              </a:spcBef>
+              <a:spcAft>
+                <a:spcPts val="0"/>
+              </a:spcAft>
+              <a:buClr>
+                <a:schemeClr val="dk1"/>
+              </a:buClr>
+              <a:buSzPts val="2400"/>
+              <a:buNone/>
+            </a:pPr>
+            <a:r>
+              <a:rPr lang="en" sz="2000"/>
+              <a:t>Values that are True when casted to Boolean are </a:t>
+            </a:r>
+            <a:r>
+              <a:rPr b="1" lang="en" sz="2000">
+                <a:solidFill>
+                  <a:schemeClr val="accent6"/>
+                </a:solidFill>
+              </a:rPr>
+              <a:t>truthy</a:t>
+            </a:r>
+            <a:endParaRPr sz="2000">
+              <a:solidFill>
+                <a:schemeClr val="accent6"/>
+              </a:solidFill>
+            </a:endParaRPr>
+          </a:p>
+          <a:p>
+            <a:pPr indent="0" lvl="0" marL="0" rtl="0" algn="l">
+              <a:lnSpc>
+                <a:spcPct val="90000"/>
+              </a:lnSpc>
+              <a:spcBef>
+                <a:spcPts val="800"/>
+              </a:spcBef>
+              <a:spcAft>
+                <a:spcPts val="0"/>
+              </a:spcAft>
+              <a:buClr>
+                <a:schemeClr val="dk1"/>
+              </a:buClr>
+              <a:buSzPts val="2400"/>
+              <a:buNone/>
+            </a:pPr>
+            <a:r>
+              <a:t/>
+            </a:r>
+            <a:endParaRPr sz="2000"/>
+          </a:p>
+          <a:p>
+            <a:pPr indent="0" lvl="0" marL="0" rtl="0" algn="l">
+              <a:lnSpc>
+                <a:spcPct val="90000"/>
+              </a:lnSpc>
+              <a:spcBef>
+                <a:spcPts val="800"/>
+              </a:spcBef>
+              <a:spcAft>
+                <a:spcPts val="0"/>
+              </a:spcAft>
+              <a:buClr>
+                <a:schemeClr val="dk1"/>
+              </a:buClr>
+              <a:buSzPts val="2400"/>
+              <a:buNone/>
+            </a:pPr>
+            <a:r>
+              <a:rPr lang="en" sz="2000"/>
+              <a:t>Note: assert only checks that the value is truthy, not that it is truly True</a:t>
+            </a:r>
+            <a:endParaRPr sz="2000"/>
+          </a:p>
+          <a:p>
+            <a:pPr indent="0" lvl="0" marL="0" rtl="0" algn="l">
+              <a:lnSpc>
+                <a:spcPct val="90000"/>
+              </a:lnSpc>
+              <a:spcBef>
+                <a:spcPts val="800"/>
+              </a:spcBef>
+              <a:spcAft>
+                <a:spcPts val="0"/>
+              </a:spcAft>
+              <a:buClr>
+                <a:schemeClr val="dk1"/>
+              </a:buClr>
+              <a:buSzPts val="2400"/>
+              <a:buNone/>
+            </a:pPr>
+            <a:r>
+              <a:t/>
+            </a:r>
+            <a:endParaRPr sz="2000"/>
+          </a:p>
+          <a:p>
+            <a:pPr indent="0" lvl="0" marL="0" rtl="0" algn="l">
+              <a:lnSpc>
+                <a:spcPct val="90000"/>
+              </a:lnSpc>
+              <a:spcBef>
+                <a:spcPts val="800"/>
+              </a:spcBef>
+              <a:spcAft>
+                <a:spcPts val="1200"/>
+              </a:spcAft>
+              <a:buClr>
+                <a:schemeClr val="dk1"/>
+              </a:buClr>
+              <a:buSzPts val="2400"/>
+              <a:buNone/>
+            </a:pPr>
+            <a:r>
+              <a:rPr lang="en" sz="2000"/>
+              <a:t>Falsy and Truthy as terms are </a:t>
+            </a:r>
+            <a:r>
+              <a:rPr lang="en" sz="2000"/>
+              <a:t>prominently</a:t>
+            </a:r>
+            <a:r>
+              <a:rPr lang="en" sz="2000"/>
+              <a:t> used in JavaScript</a:t>
+            </a:r>
+            <a:endParaRPr sz="2000"/>
           </a:p>
         </p:txBody>
       </p:sp>
@@ -38301,1124 +39161,9 @@
           </a:p>
         </p:txBody>
       </p:sp>
-    </p:spTree>
-  </p:cSld>
-  <p:clrMapOvr>
-    <a:masterClrMapping/>
-  </p:clrMapOvr>
-</p:sld>
-</file>
-
-<file path=ppt/slides/slide32.xml><?xml version="1.0" encoding="utf-8"?>
-<p:sld xmlns:a="http://schemas.openxmlformats.org/drawingml/2006/main" xmlns:r="http://schemas.openxmlformats.org/officeDocument/2006/relationships" xmlns:mc="http://schemas.openxmlformats.org/markup-compatibility/2006" xmlns:mv="urn:schemas-microsoft-com:mac:vml" xmlns:p="http://schemas.openxmlformats.org/presentationml/2006/main" xmlns:c="http://schemas.openxmlformats.org/drawingml/2006/chart" xmlns:dgm="http://schemas.openxmlformats.org/drawingml/2006/diagram" xmlns:o="urn:schemas-microsoft-com:office:office" xmlns:v="urn:schemas-microsoft-com:vml" xmlns:pvml="urn:schemas-microsoft-com:office:powerpoint" xmlns:com="http://schemas.openxmlformats.org/drawingml/2006/compatibility" xmlns:p14="http://schemas.microsoft.com/office/powerpoint/2010/main" xmlns:p15="http://schemas.microsoft.com/office/powerpoint/2012/main" xmlns:ahyp="http://schemas.microsoft.com/office/drawing/2018/hyperlinkcolor">
-  <p:cSld>
-    <p:spTree>
-      <p:nvGrpSpPr>
-        <p:cNvPr id="397" name="Shape 397"/>
-        <p:cNvGrpSpPr/>
-        <p:nvPr/>
-      </p:nvGrpSpPr>
-      <p:grpSpPr>
-        <a:xfrm>
-          <a:off x="0" y="0"/>
-          <a:ext cx="0" cy="0"/>
-          <a:chOff x="0" y="0"/>
-          <a:chExt cx="0" cy="0"/>
-        </a:xfrm>
-      </p:grpSpPr>
       <p:sp>
         <p:nvSpPr>
-          <p:cNvPr id="398" name="Google Shape;398;p59"/>
-          <p:cNvSpPr txBox="1"/>
-          <p:nvPr>
-            <p:ph type="title"/>
-          </p:nvPr>
-        </p:nvSpPr>
-        <p:spPr>
-          <a:xfrm>
-            <a:off x="387900" y="239600"/>
-            <a:ext cx="8368200" cy="686100"/>
-          </a:xfrm>
-          <a:prstGeom prst="rect">
-            <a:avLst/>
-          </a:prstGeom>
-          <a:noFill/>
-          <a:ln>
-            <a:noFill/>
-          </a:ln>
-        </p:spPr>
-        <p:txBody>
-          <a:bodyPr anchorCtr="0" anchor="ctr" bIns="34275" lIns="68575" spcFirstLastPara="1" rIns="68575" wrap="square" tIns="34275">
-            <a:normAutofit/>
-          </a:bodyPr>
-          <a:lstStyle/>
-          <a:p>
-            <a:pPr indent="0" lvl="0" marL="0" rtl="0" algn="l">
-              <a:lnSpc>
-                <a:spcPct val="90000"/>
-              </a:lnSpc>
-              <a:spcBef>
-                <a:spcPts val="0"/>
-              </a:spcBef>
-              <a:spcAft>
-                <a:spcPts val="0"/>
-              </a:spcAft>
-              <a:buClr>
-                <a:schemeClr val="dk1"/>
-              </a:buClr>
-              <a:buSzPts val="3300"/>
-              <a:buFont typeface="Calibri"/>
-              <a:buNone/>
-            </a:pPr>
-            <a:r>
-              <a:rPr lang="en"/>
-              <a:t>Casting to a bool</a:t>
-            </a:r>
-            <a:endParaRPr/>
-          </a:p>
-        </p:txBody>
-      </p:sp>
-      <p:sp>
-        <p:nvSpPr>
-          <p:cNvPr id="399" name="Google Shape;399;p59"/>
-          <p:cNvSpPr txBox="1"/>
-          <p:nvPr>
-            <p:ph idx="1" type="body"/>
-          </p:nvPr>
-        </p:nvSpPr>
-        <p:spPr>
-          <a:xfrm>
-            <a:off x="387900" y="1116950"/>
-            <a:ext cx="4184100" cy="3787500"/>
-          </a:xfrm>
-          <a:prstGeom prst="rect">
-            <a:avLst/>
-          </a:prstGeom>
-          <a:noFill/>
-          <a:ln>
-            <a:noFill/>
-          </a:ln>
-        </p:spPr>
-        <p:txBody>
-          <a:bodyPr anchorCtr="0" anchor="t" bIns="34275" lIns="68575" spcFirstLastPara="1" rIns="68575" wrap="square" tIns="34275">
-            <a:noAutofit/>
-          </a:bodyPr>
-          <a:lstStyle/>
-          <a:p>
-            <a:pPr indent="0" lvl="0" marL="0" rtl="0" algn="l">
-              <a:lnSpc>
-                <a:spcPct val="90000"/>
-              </a:lnSpc>
-              <a:spcBef>
-                <a:spcPts val="0"/>
-              </a:spcBef>
-              <a:spcAft>
-                <a:spcPts val="0"/>
-              </a:spcAft>
-              <a:buClr>
-                <a:schemeClr val="dk1"/>
-              </a:buClr>
-              <a:buSzPts val="2400"/>
-              <a:buNone/>
-            </a:pPr>
-            <a:r>
-              <a:rPr lang="en" sz="2000"/>
-              <a:t>Values that are False when casted to Boolean are </a:t>
-            </a:r>
-            <a:r>
-              <a:rPr b="1" lang="en" sz="2000">
-                <a:solidFill>
-                  <a:schemeClr val="accent6"/>
-                </a:solidFill>
-              </a:rPr>
-              <a:t>falsy</a:t>
-            </a:r>
-            <a:endParaRPr b="1" sz="2000">
-              <a:solidFill>
-                <a:schemeClr val="accent6"/>
-              </a:solidFill>
-            </a:endParaRPr>
-          </a:p>
-          <a:p>
-            <a:pPr indent="0" lvl="0" marL="0" rtl="0" algn="l">
-              <a:lnSpc>
-                <a:spcPct val="90000"/>
-              </a:lnSpc>
-              <a:spcBef>
-                <a:spcPts val="800"/>
-              </a:spcBef>
-              <a:spcAft>
-                <a:spcPts val="0"/>
-              </a:spcAft>
-              <a:buClr>
-                <a:schemeClr val="dk1"/>
-              </a:buClr>
-              <a:buSzPts val="2400"/>
-              <a:buNone/>
-            </a:pPr>
-            <a:r>
-              <a:t/>
-            </a:r>
-            <a:endParaRPr sz="2000"/>
-          </a:p>
-          <a:p>
-            <a:pPr indent="0" lvl="0" marL="0" rtl="0" algn="l">
-              <a:lnSpc>
-                <a:spcPct val="90000"/>
-              </a:lnSpc>
-              <a:spcBef>
-                <a:spcPts val="800"/>
-              </a:spcBef>
-              <a:spcAft>
-                <a:spcPts val="0"/>
-              </a:spcAft>
-              <a:buClr>
-                <a:schemeClr val="dk1"/>
-              </a:buClr>
-              <a:buSzPts val="2400"/>
-              <a:buNone/>
-            </a:pPr>
-            <a:r>
-              <a:rPr lang="en" sz="2000"/>
-              <a:t>Values that are True when casted to Boolean are </a:t>
-            </a:r>
-            <a:r>
-              <a:rPr b="1" lang="en" sz="2000">
-                <a:solidFill>
-                  <a:schemeClr val="accent6"/>
-                </a:solidFill>
-              </a:rPr>
-              <a:t>truthy</a:t>
-            </a:r>
-            <a:endParaRPr sz="2000">
-              <a:solidFill>
-                <a:schemeClr val="accent6"/>
-              </a:solidFill>
-            </a:endParaRPr>
-          </a:p>
-          <a:p>
-            <a:pPr indent="0" lvl="0" marL="0" rtl="0" algn="l">
-              <a:lnSpc>
-                <a:spcPct val="90000"/>
-              </a:lnSpc>
-              <a:spcBef>
-                <a:spcPts val="800"/>
-              </a:spcBef>
-              <a:spcAft>
-                <a:spcPts val="0"/>
-              </a:spcAft>
-              <a:buClr>
-                <a:schemeClr val="dk1"/>
-              </a:buClr>
-              <a:buSzPts val="2400"/>
-              <a:buNone/>
-            </a:pPr>
-            <a:r>
-              <a:t/>
-            </a:r>
-            <a:endParaRPr sz="2000"/>
-          </a:p>
-          <a:p>
-            <a:pPr indent="0" lvl="0" marL="0" rtl="0" algn="l">
-              <a:lnSpc>
-                <a:spcPct val="90000"/>
-              </a:lnSpc>
-              <a:spcBef>
-                <a:spcPts val="800"/>
-              </a:spcBef>
-              <a:spcAft>
-                <a:spcPts val="0"/>
-              </a:spcAft>
-              <a:buClr>
-                <a:schemeClr val="dk1"/>
-              </a:buClr>
-              <a:buSzPts val="2400"/>
-              <a:buNone/>
-            </a:pPr>
-            <a:r>
-              <a:rPr lang="en" sz="2000"/>
-              <a:t>Note: assert only checks that the value is truthy, not that it is truly True</a:t>
-            </a:r>
-            <a:endParaRPr sz="2000"/>
-          </a:p>
-          <a:p>
-            <a:pPr indent="0" lvl="0" marL="0" rtl="0" algn="l">
-              <a:lnSpc>
-                <a:spcPct val="90000"/>
-              </a:lnSpc>
-              <a:spcBef>
-                <a:spcPts val="800"/>
-              </a:spcBef>
-              <a:spcAft>
-                <a:spcPts val="0"/>
-              </a:spcAft>
-              <a:buClr>
-                <a:schemeClr val="dk1"/>
-              </a:buClr>
-              <a:buSzPts val="2400"/>
-              <a:buNone/>
-            </a:pPr>
-            <a:r>
-              <a:t/>
-            </a:r>
-            <a:endParaRPr sz="2000"/>
-          </a:p>
-          <a:p>
-            <a:pPr indent="0" lvl="0" marL="0" rtl="0" algn="l">
-              <a:lnSpc>
-                <a:spcPct val="90000"/>
-              </a:lnSpc>
-              <a:spcBef>
-                <a:spcPts val="800"/>
-              </a:spcBef>
-              <a:spcAft>
-                <a:spcPts val="1200"/>
-              </a:spcAft>
-              <a:buClr>
-                <a:schemeClr val="dk1"/>
-              </a:buClr>
-              <a:buSzPts val="2400"/>
-              <a:buNone/>
-            </a:pPr>
-            <a:r>
-              <a:rPr lang="en" sz="2000"/>
-              <a:t>Falsy and Truthy as terms are </a:t>
-            </a:r>
-            <a:r>
-              <a:rPr lang="en" sz="2000"/>
-              <a:t>prominently</a:t>
-            </a:r>
-            <a:r>
-              <a:rPr lang="en" sz="2000"/>
-              <a:t> used in JavaScript</a:t>
-            </a:r>
-            <a:endParaRPr sz="2000"/>
-          </a:p>
-        </p:txBody>
-      </p:sp>
-      <p:sp>
-        <p:nvSpPr>
-          <p:cNvPr id="400" name="Google Shape;400;p59"/>
-          <p:cNvSpPr txBox="1"/>
-          <p:nvPr/>
-        </p:nvSpPr>
-        <p:spPr>
-          <a:xfrm>
-            <a:off x="4572000" y="1341775"/>
-            <a:ext cx="2676600" cy="2839800"/>
-          </a:xfrm>
-          <a:prstGeom prst="rect">
-            <a:avLst/>
-          </a:prstGeom>
-          <a:solidFill>
-            <a:schemeClr val="dk1"/>
-          </a:solidFill>
-          <a:ln cap="flat" cmpd="sng" w="19050">
-            <a:solidFill>
-              <a:schemeClr val="dk2"/>
-            </a:solidFill>
-            <a:prstDash val="solid"/>
-            <a:round/>
-            <a:headEnd len="sm" w="sm" type="none"/>
-            <a:tailEnd len="sm" w="sm" type="none"/>
-          </a:ln>
-          <a:effectLst>
-            <a:outerShdw blurRad="57150" rotWithShape="0" algn="bl" dir="5400000" dist="19050">
-              <a:srgbClr val="000000">
-                <a:alpha val="50000"/>
-              </a:srgbClr>
-            </a:outerShdw>
-          </a:effectLst>
-        </p:spPr>
-        <p:txBody>
-          <a:bodyPr anchorCtr="0" anchor="t" bIns="34275" lIns="68575" spcFirstLastPara="1" rIns="68575" wrap="square" tIns="34275">
-            <a:spAutoFit/>
-          </a:bodyPr>
-          <a:lstStyle/>
-          <a:p>
-            <a:pPr indent="0" lvl="0" marL="0" marR="0" rtl="0" algn="l">
-              <a:spcBef>
-                <a:spcPts val="0"/>
-              </a:spcBef>
-              <a:spcAft>
-                <a:spcPts val="0"/>
-              </a:spcAft>
-              <a:buNone/>
-            </a:pPr>
-            <a:r>
-              <a:rPr b="0" lang="en" sz="1800">
-                <a:solidFill>
-                  <a:srgbClr val="795E26"/>
-                </a:solidFill>
-                <a:latin typeface="Consolas"/>
-                <a:ea typeface="Consolas"/>
-                <a:cs typeface="Consolas"/>
-                <a:sym typeface="Consolas"/>
-              </a:rPr>
-              <a:t>print</a:t>
-            </a:r>
-            <a:r>
-              <a:rPr b="0" lang="en" sz="1800">
-                <a:solidFill>
-                  <a:srgbClr val="000000"/>
-                </a:solidFill>
-                <a:latin typeface="Consolas"/>
-                <a:ea typeface="Consolas"/>
-                <a:cs typeface="Consolas"/>
-                <a:sym typeface="Consolas"/>
-              </a:rPr>
-              <a:t>(</a:t>
-            </a:r>
-            <a:r>
-              <a:rPr b="0" lang="en" sz="1800">
-                <a:solidFill>
-                  <a:srgbClr val="267F99"/>
-                </a:solidFill>
-                <a:latin typeface="Consolas"/>
-                <a:ea typeface="Consolas"/>
-                <a:cs typeface="Consolas"/>
-                <a:sym typeface="Consolas"/>
-              </a:rPr>
-              <a:t>bool</a:t>
-            </a:r>
-            <a:r>
-              <a:rPr b="0" lang="en" sz="1800">
-                <a:solidFill>
-                  <a:srgbClr val="000000"/>
-                </a:solidFill>
-                <a:latin typeface="Consolas"/>
-                <a:ea typeface="Consolas"/>
-                <a:cs typeface="Consolas"/>
-                <a:sym typeface="Consolas"/>
-              </a:rPr>
-              <a:t>(</a:t>
-            </a:r>
-            <a:r>
-              <a:rPr b="0" lang="en" sz="1800">
-                <a:solidFill>
-                  <a:srgbClr val="098658"/>
-                </a:solidFill>
-                <a:latin typeface="Consolas"/>
-                <a:ea typeface="Consolas"/>
-                <a:cs typeface="Consolas"/>
-                <a:sym typeface="Consolas"/>
-              </a:rPr>
-              <a:t>0</a:t>
-            </a:r>
-            <a:r>
-              <a:rPr b="0" lang="en" sz="1800">
-                <a:solidFill>
-                  <a:srgbClr val="000000"/>
-                </a:solidFill>
-                <a:latin typeface="Consolas"/>
-                <a:ea typeface="Consolas"/>
-                <a:cs typeface="Consolas"/>
-                <a:sym typeface="Consolas"/>
-              </a:rPr>
-              <a:t>))</a:t>
-            </a:r>
-            <a:endParaRPr sz="1100"/>
-          </a:p>
-          <a:p>
-            <a:pPr indent="0" lvl="0" marL="0" marR="0" rtl="0" algn="l">
-              <a:spcBef>
-                <a:spcPts val="0"/>
-              </a:spcBef>
-              <a:spcAft>
-                <a:spcPts val="0"/>
-              </a:spcAft>
-              <a:buNone/>
-            </a:pPr>
-            <a:r>
-              <a:rPr b="0" lang="en" sz="1800">
-                <a:solidFill>
-                  <a:srgbClr val="795E26"/>
-                </a:solidFill>
-                <a:latin typeface="Consolas"/>
-                <a:ea typeface="Consolas"/>
-                <a:cs typeface="Consolas"/>
-                <a:sym typeface="Consolas"/>
-              </a:rPr>
-              <a:t>print</a:t>
-            </a:r>
-            <a:r>
-              <a:rPr b="0" lang="en" sz="1800">
-                <a:solidFill>
-                  <a:srgbClr val="000000"/>
-                </a:solidFill>
-                <a:latin typeface="Consolas"/>
-                <a:ea typeface="Consolas"/>
-                <a:cs typeface="Consolas"/>
-                <a:sym typeface="Consolas"/>
-              </a:rPr>
-              <a:t>(</a:t>
-            </a:r>
-            <a:r>
-              <a:rPr b="0" lang="en" sz="1800">
-                <a:solidFill>
-                  <a:srgbClr val="267F99"/>
-                </a:solidFill>
-                <a:latin typeface="Consolas"/>
-                <a:ea typeface="Consolas"/>
-                <a:cs typeface="Consolas"/>
-                <a:sym typeface="Consolas"/>
-              </a:rPr>
-              <a:t>bool</a:t>
-            </a:r>
-            <a:r>
-              <a:rPr b="0" lang="en" sz="1800">
-                <a:solidFill>
-                  <a:srgbClr val="000000"/>
-                </a:solidFill>
-                <a:latin typeface="Consolas"/>
-                <a:ea typeface="Consolas"/>
-                <a:cs typeface="Consolas"/>
-                <a:sym typeface="Consolas"/>
-              </a:rPr>
-              <a:t>(</a:t>
-            </a:r>
-            <a:r>
-              <a:rPr b="0" lang="en" sz="1800">
-                <a:solidFill>
-                  <a:srgbClr val="098658"/>
-                </a:solidFill>
-                <a:latin typeface="Consolas"/>
-                <a:ea typeface="Consolas"/>
-                <a:cs typeface="Consolas"/>
-                <a:sym typeface="Consolas"/>
-              </a:rPr>
-              <a:t>0.0</a:t>
-            </a:r>
-            <a:r>
-              <a:rPr b="0" lang="en" sz="1800">
-                <a:solidFill>
-                  <a:srgbClr val="000000"/>
-                </a:solidFill>
-                <a:latin typeface="Consolas"/>
-                <a:ea typeface="Consolas"/>
-                <a:cs typeface="Consolas"/>
-                <a:sym typeface="Consolas"/>
-              </a:rPr>
-              <a:t>))</a:t>
-            </a:r>
-            <a:endParaRPr sz="1100"/>
-          </a:p>
-          <a:p>
-            <a:pPr indent="0" lvl="0" marL="0" marR="0" rtl="0" algn="l">
-              <a:spcBef>
-                <a:spcPts val="0"/>
-              </a:spcBef>
-              <a:spcAft>
-                <a:spcPts val="0"/>
-              </a:spcAft>
-              <a:buNone/>
-            </a:pPr>
-            <a:r>
-              <a:rPr b="0" lang="en" sz="1800">
-                <a:solidFill>
-                  <a:srgbClr val="795E26"/>
-                </a:solidFill>
-                <a:latin typeface="Consolas"/>
-                <a:ea typeface="Consolas"/>
-                <a:cs typeface="Consolas"/>
-                <a:sym typeface="Consolas"/>
-              </a:rPr>
-              <a:t>print</a:t>
-            </a:r>
-            <a:r>
-              <a:rPr b="0" lang="en" sz="1800">
-                <a:solidFill>
-                  <a:srgbClr val="000000"/>
-                </a:solidFill>
-                <a:latin typeface="Consolas"/>
-                <a:ea typeface="Consolas"/>
-                <a:cs typeface="Consolas"/>
-                <a:sym typeface="Consolas"/>
-              </a:rPr>
-              <a:t>(</a:t>
-            </a:r>
-            <a:r>
-              <a:rPr b="0" lang="en" sz="1800">
-                <a:solidFill>
-                  <a:srgbClr val="267F99"/>
-                </a:solidFill>
-                <a:latin typeface="Consolas"/>
-                <a:ea typeface="Consolas"/>
-                <a:cs typeface="Consolas"/>
-                <a:sym typeface="Consolas"/>
-              </a:rPr>
-              <a:t>bool</a:t>
-            </a:r>
-            <a:r>
-              <a:rPr b="0" lang="en" sz="1800">
-                <a:solidFill>
-                  <a:srgbClr val="000000"/>
-                </a:solidFill>
-                <a:latin typeface="Consolas"/>
-                <a:ea typeface="Consolas"/>
-                <a:cs typeface="Consolas"/>
-                <a:sym typeface="Consolas"/>
-              </a:rPr>
-              <a:t>(</a:t>
-            </a:r>
-            <a:r>
-              <a:rPr b="0" lang="en" sz="1800">
-                <a:solidFill>
-                  <a:srgbClr val="A31515"/>
-                </a:solidFill>
-                <a:latin typeface="Consolas"/>
-                <a:ea typeface="Consolas"/>
-                <a:cs typeface="Consolas"/>
-                <a:sym typeface="Consolas"/>
-              </a:rPr>
-              <a:t>''</a:t>
-            </a:r>
-            <a:r>
-              <a:rPr b="0" lang="en" sz="1800">
-                <a:solidFill>
-                  <a:srgbClr val="000000"/>
-                </a:solidFill>
-                <a:latin typeface="Consolas"/>
-                <a:ea typeface="Consolas"/>
-                <a:cs typeface="Consolas"/>
-                <a:sym typeface="Consolas"/>
-              </a:rPr>
-              <a:t>))</a:t>
-            </a:r>
-            <a:endParaRPr sz="1100"/>
-          </a:p>
-          <a:p>
-            <a:pPr indent="0" lvl="0" marL="0" marR="0" rtl="0" algn="l">
-              <a:spcBef>
-                <a:spcPts val="0"/>
-              </a:spcBef>
-              <a:spcAft>
-                <a:spcPts val="0"/>
-              </a:spcAft>
-              <a:buNone/>
-            </a:pPr>
-            <a:r>
-              <a:rPr b="0" lang="en" sz="1800">
-                <a:solidFill>
-                  <a:srgbClr val="795E26"/>
-                </a:solidFill>
-                <a:latin typeface="Consolas"/>
-                <a:ea typeface="Consolas"/>
-                <a:cs typeface="Consolas"/>
-                <a:sym typeface="Consolas"/>
-              </a:rPr>
-              <a:t>print</a:t>
-            </a:r>
-            <a:r>
-              <a:rPr b="0" lang="en" sz="1800">
-                <a:solidFill>
-                  <a:srgbClr val="000000"/>
-                </a:solidFill>
-                <a:latin typeface="Consolas"/>
-                <a:ea typeface="Consolas"/>
-                <a:cs typeface="Consolas"/>
-                <a:sym typeface="Consolas"/>
-              </a:rPr>
-              <a:t>(</a:t>
-            </a:r>
-            <a:r>
-              <a:rPr b="0" lang="en" sz="1800">
-                <a:solidFill>
-                  <a:srgbClr val="267F99"/>
-                </a:solidFill>
-                <a:latin typeface="Consolas"/>
-                <a:ea typeface="Consolas"/>
-                <a:cs typeface="Consolas"/>
-                <a:sym typeface="Consolas"/>
-              </a:rPr>
-              <a:t>bool</a:t>
-            </a:r>
-            <a:r>
-              <a:rPr b="0" lang="en" sz="1800">
-                <a:solidFill>
-                  <a:srgbClr val="000000"/>
-                </a:solidFill>
-                <a:latin typeface="Consolas"/>
-                <a:ea typeface="Consolas"/>
-                <a:cs typeface="Consolas"/>
-                <a:sym typeface="Consolas"/>
-              </a:rPr>
-              <a:t>(</a:t>
-            </a:r>
-            <a:r>
-              <a:rPr b="0" lang="en" sz="1800">
-                <a:solidFill>
-                  <a:srgbClr val="0000FF"/>
-                </a:solidFill>
-                <a:latin typeface="Consolas"/>
-                <a:ea typeface="Consolas"/>
-                <a:cs typeface="Consolas"/>
-                <a:sym typeface="Consolas"/>
-              </a:rPr>
-              <a:t>False</a:t>
-            </a:r>
-            <a:r>
-              <a:rPr b="0" lang="en" sz="1800">
-                <a:solidFill>
-                  <a:srgbClr val="000000"/>
-                </a:solidFill>
-                <a:latin typeface="Consolas"/>
-                <a:ea typeface="Consolas"/>
-                <a:cs typeface="Consolas"/>
-                <a:sym typeface="Consolas"/>
-              </a:rPr>
-              <a:t>))</a:t>
-            </a:r>
-            <a:endParaRPr sz="1100"/>
-          </a:p>
-          <a:p>
-            <a:pPr indent="0" lvl="0" marL="0" marR="0" rtl="0" algn="l">
-              <a:spcBef>
-                <a:spcPts val="0"/>
-              </a:spcBef>
-              <a:spcAft>
-                <a:spcPts val="0"/>
-              </a:spcAft>
-              <a:buNone/>
-            </a:pPr>
-            <a:r>
-              <a:rPr b="0" lang="en" sz="1800">
-                <a:solidFill>
-                  <a:srgbClr val="795E26"/>
-                </a:solidFill>
-                <a:latin typeface="Consolas"/>
-                <a:ea typeface="Consolas"/>
-                <a:cs typeface="Consolas"/>
-                <a:sym typeface="Consolas"/>
-              </a:rPr>
-              <a:t>print</a:t>
-            </a:r>
-            <a:r>
-              <a:rPr b="0" lang="en" sz="1800">
-                <a:solidFill>
-                  <a:srgbClr val="000000"/>
-                </a:solidFill>
-                <a:latin typeface="Consolas"/>
-                <a:ea typeface="Consolas"/>
-                <a:cs typeface="Consolas"/>
-                <a:sym typeface="Consolas"/>
-              </a:rPr>
-              <a:t>(</a:t>
-            </a:r>
-            <a:r>
-              <a:rPr b="0" lang="en" sz="1800">
-                <a:solidFill>
-                  <a:srgbClr val="267F99"/>
-                </a:solidFill>
-                <a:latin typeface="Consolas"/>
-                <a:ea typeface="Consolas"/>
-                <a:cs typeface="Consolas"/>
-                <a:sym typeface="Consolas"/>
-              </a:rPr>
-              <a:t>bool</a:t>
-            </a:r>
-            <a:r>
-              <a:rPr b="0" lang="en" sz="1800">
-                <a:solidFill>
-                  <a:srgbClr val="000000"/>
-                </a:solidFill>
-                <a:latin typeface="Consolas"/>
-                <a:ea typeface="Consolas"/>
-                <a:cs typeface="Consolas"/>
-                <a:sym typeface="Consolas"/>
-              </a:rPr>
-              <a:t>(</a:t>
-            </a:r>
-            <a:r>
-              <a:rPr b="0" lang="en" sz="1800">
-                <a:solidFill>
-                  <a:srgbClr val="0000FF"/>
-                </a:solidFill>
-                <a:latin typeface="Consolas"/>
-                <a:ea typeface="Consolas"/>
-                <a:cs typeface="Consolas"/>
-                <a:sym typeface="Consolas"/>
-              </a:rPr>
-              <a:t>None</a:t>
-            </a:r>
-            <a:r>
-              <a:rPr b="0" lang="en" sz="1800">
-                <a:solidFill>
-                  <a:srgbClr val="000000"/>
-                </a:solidFill>
-                <a:latin typeface="Consolas"/>
-                <a:ea typeface="Consolas"/>
-                <a:cs typeface="Consolas"/>
-                <a:sym typeface="Consolas"/>
-              </a:rPr>
-              <a:t>))</a:t>
-            </a:r>
-            <a:endParaRPr sz="1100"/>
-          </a:p>
-          <a:p>
-            <a:pPr indent="0" lvl="0" marL="0" marR="0" rtl="0" algn="l">
-              <a:spcBef>
-                <a:spcPts val="0"/>
-              </a:spcBef>
-              <a:spcAft>
-                <a:spcPts val="0"/>
-              </a:spcAft>
-              <a:buNone/>
-            </a:pPr>
-            <a:r>
-              <a:t/>
-            </a:r>
-            <a:endParaRPr b="0" sz="1800">
-              <a:solidFill>
-                <a:srgbClr val="795E26"/>
-              </a:solidFill>
-              <a:latin typeface="Consolas"/>
-              <a:ea typeface="Consolas"/>
-              <a:cs typeface="Consolas"/>
-              <a:sym typeface="Consolas"/>
-            </a:endParaRPr>
-          </a:p>
-          <a:p>
-            <a:pPr indent="0" lvl="0" marL="0" marR="0" rtl="0" algn="l">
-              <a:spcBef>
-                <a:spcPts val="0"/>
-              </a:spcBef>
-              <a:spcAft>
-                <a:spcPts val="0"/>
-              </a:spcAft>
-              <a:buNone/>
-            </a:pPr>
-            <a:r>
-              <a:rPr b="0" lang="en" sz="1800">
-                <a:solidFill>
-                  <a:srgbClr val="795E26"/>
-                </a:solidFill>
-                <a:latin typeface="Consolas"/>
-                <a:ea typeface="Consolas"/>
-                <a:cs typeface="Consolas"/>
-                <a:sym typeface="Consolas"/>
-              </a:rPr>
-              <a:t>print</a:t>
-            </a:r>
-            <a:r>
-              <a:rPr b="0" lang="en" sz="1800">
-                <a:solidFill>
-                  <a:srgbClr val="000000"/>
-                </a:solidFill>
-                <a:latin typeface="Consolas"/>
-                <a:ea typeface="Consolas"/>
-                <a:cs typeface="Consolas"/>
-                <a:sym typeface="Consolas"/>
-              </a:rPr>
-              <a:t>(</a:t>
-            </a:r>
-            <a:r>
-              <a:rPr b="0" lang="en" sz="1800">
-                <a:solidFill>
-                  <a:srgbClr val="267F99"/>
-                </a:solidFill>
-                <a:latin typeface="Consolas"/>
-                <a:ea typeface="Consolas"/>
-                <a:cs typeface="Consolas"/>
-                <a:sym typeface="Consolas"/>
-              </a:rPr>
-              <a:t>bool</a:t>
-            </a:r>
-            <a:r>
-              <a:rPr b="0" lang="en" sz="1800">
-                <a:solidFill>
-                  <a:srgbClr val="000000"/>
-                </a:solidFill>
-                <a:latin typeface="Consolas"/>
-                <a:ea typeface="Consolas"/>
-                <a:cs typeface="Consolas"/>
-                <a:sym typeface="Consolas"/>
-              </a:rPr>
-              <a:t>(</a:t>
-            </a:r>
-            <a:r>
-              <a:rPr b="0" lang="en" sz="1800">
-                <a:solidFill>
-                  <a:srgbClr val="098658"/>
-                </a:solidFill>
-                <a:latin typeface="Consolas"/>
-                <a:ea typeface="Consolas"/>
-                <a:cs typeface="Consolas"/>
-                <a:sym typeface="Consolas"/>
-              </a:rPr>
-              <a:t>1</a:t>
-            </a:r>
-            <a:r>
-              <a:rPr b="0" lang="en" sz="1800">
-                <a:solidFill>
-                  <a:srgbClr val="000000"/>
-                </a:solidFill>
-                <a:latin typeface="Consolas"/>
-                <a:ea typeface="Consolas"/>
-                <a:cs typeface="Consolas"/>
-                <a:sym typeface="Consolas"/>
-              </a:rPr>
-              <a:t>))</a:t>
-            </a:r>
-            <a:endParaRPr sz="1100"/>
-          </a:p>
-          <a:p>
-            <a:pPr indent="0" lvl="0" marL="0" marR="0" rtl="0" algn="l">
-              <a:spcBef>
-                <a:spcPts val="0"/>
-              </a:spcBef>
-              <a:spcAft>
-                <a:spcPts val="0"/>
-              </a:spcAft>
-              <a:buNone/>
-            </a:pPr>
-            <a:r>
-              <a:rPr b="0" lang="en" sz="1800">
-                <a:solidFill>
-                  <a:srgbClr val="795E26"/>
-                </a:solidFill>
-                <a:latin typeface="Consolas"/>
-                <a:ea typeface="Consolas"/>
-                <a:cs typeface="Consolas"/>
-                <a:sym typeface="Consolas"/>
-              </a:rPr>
-              <a:t>print</a:t>
-            </a:r>
-            <a:r>
-              <a:rPr b="0" lang="en" sz="1800">
-                <a:solidFill>
-                  <a:srgbClr val="000000"/>
-                </a:solidFill>
-                <a:latin typeface="Consolas"/>
-                <a:ea typeface="Consolas"/>
-                <a:cs typeface="Consolas"/>
-                <a:sym typeface="Consolas"/>
-              </a:rPr>
-              <a:t>(</a:t>
-            </a:r>
-            <a:r>
-              <a:rPr b="0" lang="en" sz="1800">
-                <a:solidFill>
-                  <a:srgbClr val="267F99"/>
-                </a:solidFill>
-                <a:latin typeface="Consolas"/>
-                <a:ea typeface="Consolas"/>
-                <a:cs typeface="Consolas"/>
-                <a:sym typeface="Consolas"/>
-              </a:rPr>
-              <a:t>bool</a:t>
-            </a:r>
-            <a:r>
-              <a:rPr b="0" lang="en" sz="1800">
-                <a:solidFill>
-                  <a:srgbClr val="000000"/>
-                </a:solidFill>
-                <a:latin typeface="Consolas"/>
-                <a:ea typeface="Consolas"/>
-                <a:cs typeface="Consolas"/>
-                <a:sym typeface="Consolas"/>
-              </a:rPr>
-              <a:t>(</a:t>
-            </a:r>
-            <a:r>
-              <a:rPr b="0" lang="en" sz="1800">
-                <a:solidFill>
-                  <a:srgbClr val="098658"/>
-                </a:solidFill>
-                <a:latin typeface="Consolas"/>
-                <a:ea typeface="Consolas"/>
-                <a:cs typeface="Consolas"/>
-                <a:sym typeface="Consolas"/>
-              </a:rPr>
-              <a:t>0.1</a:t>
-            </a:r>
-            <a:r>
-              <a:rPr b="0" lang="en" sz="1800">
-                <a:solidFill>
-                  <a:srgbClr val="000000"/>
-                </a:solidFill>
-                <a:latin typeface="Consolas"/>
-                <a:ea typeface="Consolas"/>
-                <a:cs typeface="Consolas"/>
-                <a:sym typeface="Consolas"/>
-              </a:rPr>
-              <a:t>))</a:t>
-            </a:r>
-            <a:endParaRPr sz="1100"/>
-          </a:p>
-          <a:p>
-            <a:pPr indent="0" lvl="0" marL="0" marR="0" rtl="0" algn="l">
-              <a:spcBef>
-                <a:spcPts val="0"/>
-              </a:spcBef>
-              <a:spcAft>
-                <a:spcPts val="0"/>
-              </a:spcAft>
-              <a:buNone/>
-            </a:pPr>
-            <a:r>
-              <a:rPr b="0" lang="en" sz="1800">
-                <a:solidFill>
-                  <a:srgbClr val="795E26"/>
-                </a:solidFill>
-                <a:latin typeface="Consolas"/>
-                <a:ea typeface="Consolas"/>
-                <a:cs typeface="Consolas"/>
-                <a:sym typeface="Consolas"/>
-              </a:rPr>
-              <a:t>print</a:t>
-            </a:r>
-            <a:r>
-              <a:rPr b="0" lang="en" sz="1800">
-                <a:solidFill>
-                  <a:srgbClr val="000000"/>
-                </a:solidFill>
-                <a:latin typeface="Consolas"/>
-                <a:ea typeface="Consolas"/>
-                <a:cs typeface="Consolas"/>
-                <a:sym typeface="Consolas"/>
-              </a:rPr>
-              <a:t>(</a:t>
-            </a:r>
-            <a:r>
-              <a:rPr b="0" lang="en" sz="1800">
-                <a:solidFill>
-                  <a:srgbClr val="267F99"/>
-                </a:solidFill>
-                <a:latin typeface="Consolas"/>
-                <a:ea typeface="Consolas"/>
-                <a:cs typeface="Consolas"/>
-                <a:sym typeface="Consolas"/>
-              </a:rPr>
-              <a:t>bool</a:t>
-            </a:r>
-            <a:r>
-              <a:rPr b="0" lang="en" sz="1800">
-                <a:solidFill>
-                  <a:srgbClr val="000000"/>
-                </a:solidFill>
-                <a:latin typeface="Consolas"/>
-                <a:ea typeface="Consolas"/>
-                <a:cs typeface="Consolas"/>
-                <a:sym typeface="Consolas"/>
-              </a:rPr>
-              <a:t>(</a:t>
-            </a:r>
-            <a:r>
-              <a:rPr b="0" lang="en" sz="1800">
-                <a:solidFill>
-                  <a:srgbClr val="A31515"/>
-                </a:solidFill>
-                <a:latin typeface="Consolas"/>
-                <a:ea typeface="Consolas"/>
-                <a:cs typeface="Consolas"/>
-                <a:sym typeface="Consolas"/>
-              </a:rPr>
-              <a:t>'Hi'</a:t>
-            </a:r>
-            <a:r>
-              <a:rPr b="0" lang="en" sz="1800">
-                <a:solidFill>
-                  <a:srgbClr val="000000"/>
-                </a:solidFill>
-                <a:latin typeface="Consolas"/>
-                <a:ea typeface="Consolas"/>
-                <a:cs typeface="Consolas"/>
-                <a:sym typeface="Consolas"/>
-              </a:rPr>
-              <a:t>))</a:t>
-            </a:r>
-            <a:endParaRPr sz="1100"/>
-          </a:p>
-          <a:p>
-            <a:pPr indent="0" lvl="0" marL="0" marR="0" rtl="0" algn="l">
-              <a:spcBef>
-                <a:spcPts val="0"/>
-              </a:spcBef>
-              <a:spcAft>
-                <a:spcPts val="0"/>
-              </a:spcAft>
-              <a:buNone/>
-            </a:pPr>
-            <a:r>
-              <a:rPr b="0" lang="en" sz="1800">
-                <a:solidFill>
-                  <a:srgbClr val="795E26"/>
-                </a:solidFill>
-                <a:latin typeface="Consolas"/>
-                <a:ea typeface="Consolas"/>
-                <a:cs typeface="Consolas"/>
-                <a:sym typeface="Consolas"/>
-              </a:rPr>
-              <a:t>print</a:t>
-            </a:r>
-            <a:r>
-              <a:rPr b="0" lang="en" sz="1800">
-                <a:solidFill>
-                  <a:srgbClr val="000000"/>
-                </a:solidFill>
-                <a:latin typeface="Consolas"/>
-                <a:ea typeface="Consolas"/>
-                <a:cs typeface="Consolas"/>
-                <a:sym typeface="Consolas"/>
-              </a:rPr>
-              <a:t>(</a:t>
-            </a:r>
-            <a:r>
-              <a:rPr b="0" lang="en" sz="1800">
-                <a:solidFill>
-                  <a:srgbClr val="267F99"/>
-                </a:solidFill>
-                <a:latin typeface="Consolas"/>
-                <a:ea typeface="Consolas"/>
-                <a:cs typeface="Consolas"/>
-                <a:sym typeface="Consolas"/>
-              </a:rPr>
-              <a:t>bool</a:t>
-            </a:r>
-            <a:r>
-              <a:rPr b="0" lang="en" sz="1800">
-                <a:solidFill>
-                  <a:srgbClr val="000000"/>
-                </a:solidFill>
-                <a:latin typeface="Consolas"/>
-                <a:ea typeface="Consolas"/>
-                <a:cs typeface="Consolas"/>
-                <a:sym typeface="Consolas"/>
-              </a:rPr>
-              <a:t>(</a:t>
-            </a:r>
-            <a:r>
-              <a:rPr b="0" lang="en" sz="1800">
-                <a:solidFill>
-                  <a:srgbClr val="0000FF"/>
-                </a:solidFill>
-                <a:latin typeface="Consolas"/>
-                <a:ea typeface="Consolas"/>
-                <a:cs typeface="Consolas"/>
-                <a:sym typeface="Consolas"/>
-              </a:rPr>
-              <a:t>True</a:t>
-            </a:r>
-            <a:r>
-              <a:rPr b="0" lang="en" sz="1800">
-                <a:solidFill>
-                  <a:srgbClr val="000000"/>
-                </a:solidFill>
-                <a:latin typeface="Consolas"/>
-                <a:ea typeface="Consolas"/>
-                <a:cs typeface="Consolas"/>
-                <a:sym typeface="Consolas"/>
-              </a:rPr>
-              <a:t>))</a:t>
-            </a:r>
-            <a:endParaRPr sz="1100"/>
-          </a:p>
-        </p:txBody>
-      </p:sp>
-      <p:sp>
-        <p:nvSpPr>
-          <p:cNvPr id="401" name="Google Shape;401;p59"/>
+          <p:cNvPr id="394" name="Google Shape;394;p58"/>
           <p:cNvSpPr txBox="1"/>
           <p:nvPr/>
         </p:nvSpPr>
@@ -39726,12 +39471,12 @@
 </p:sld>
 </file>
 
-<file path=ppt/slides/slide33.xml><?xml version="1.0" encoding="utf-8"?>
+<file path=ppt/slides/slide32.xml><?xml version="1.0" encoding="utf-8"?>
 <p:sld xmlns:a="http://schemas.openxmlformats.org/drawingml/2006/main" xmlns:r="http://schemas.openxmlformats.org/officeDocument/2006/relationships" xmlns:mc="http://schemas.openxmlformats.org/markup-compatibility/2006" xmlns:mv="urn:schemas-microsoft-com:mac:vml" xmlns:p="http://schemas.openxmlformats.org/presentationml/2006/main" xmlns:c="http://schemas.openxmlformats.org/drawingml/2006/chart" xmlns:dgm="http://schemas.openxmlformats.org/drawingml/2006/diagram" xmlns:o="urn:schemas-microsoft-com:office:office" xmlns:v="urn:schemas-microsoft-com:vml" xmlns:pvml="urn:schemas-microsoft-com:office:powerpoint" xmlns:com="http://schemas.openxmlformats.org/drawingml/2006/compatibility" xmlns:p14="http://schemas.microsoft.com/office/powerpoint/2010/main" xmlns:p15="http://schemas.microsoft.com/office/powerpoint/2012/main" xmlns:ahyp="http://schemas.microsoft.com/office/drawing/2018/hyperlinkcolor">
   <p:cSld>
     <p:spTree>
       <p:nvGrpSpPr>
-        <p:cNvPr id="405" name="Shape 405"/>
+        <p:cNvPr id="398" name="Shape 398"/>
         <p:cNvGrpSpPr/>
         <p:nvPr/>
       </p:nvGrpSpPr>
@@ -39745,7 +39490,7 @@
       </p:grpSpPr>
       <p:sp>
         <p:nvSpPr>
-          <p:cNvPr id="406" name="Google Shape;406;p60"/>
+          <p:cNvPr id="399" name="Google Shape;399;p59"/>
           <p:cNvSpPr txBox="1"/>
           <p:nvPr>
             <p:ph type="title"/>
@@ -39786,7 +39531,7 @@
       </p:sp>
       <p:sp>
         <p:nvSpPr>
-          <p:cNvPr id="407" name="Google Shape;407;p60"/>
+          <p:cNvPr id="400" name="Google Shape;400;p59"/>
           <p:cNvSpPr txBox="1"/>
           <p:nvPr>
             <p:ph idx="1" type="body"/>
@@ -39832,12 +39577,12 @@
 </p:sld>
 </file>
 
-<file path=ppt/slides/slide34.xml><?xml version="1.0" encoding="utf-8"?>
+<file path=ppt/slides/slide33.xml><?xml version="1.0" encoding="utf-8"?>
 <p:sld xmlns:a="http://schemas.openxmlformats.org/drawingml/2006/main" xmlns:r="http://schemas.openxmlformats.org/officeDocument/2006/relationships" xmlns:mc="http://schemas.openxmlformats.org/markup-compatibility/2006" xmlns:mv="urn:schemas-microsoft-com:mac:vml" xmlns:p="http://schemas.openxmlformats.org/presentationml/2006/main" xmlns:c="http://schemas.openxmlformats.org/drawingml/2006/chart" xmlns:dgm="http://schemas.openxmlformats.org/drawingml/2006/diagram" xmlns:o="urn:schemas-microsoft-com:office:office" xmlns:v="urn:schemas-microsoft-com:vml" xmlns:pvml="urn:schemas-microsoft-com:office:powerpoint" xmlns:com="http://schemas.openxmlformats.org/drawingml/2006/compatibility" xmlns:p14="http://schemas.microsoft.com/office/powerpoint/2010/main" xmlns:p15="http://schemas.microsoft.com/office/powerpoint/2012/main" xmlns:ahyp="http://schemas.microsoft.com/office/drawing/2018/hyperlinkcolor">
   <p:cSld>
     <p:spTree>
       <p:nvGrpSpPr>
-        <p:cNvPr id="411" name="Shape 411"/>
+        <p:cNvPr id="404" name="Shape 404"/>
         <p:cNvGrpSpPr/>
         <p:nvPr/>
       </p:nvGrpSpPr>
@@ -39851,7 +39596,7 @@
       </p:grpSpPr>
       <p:sp>
         <p:nvSpPr>
-          <p:cNvPr id="412" name="Google Shape;412;p61"/>
+          <p:cNvPr id="405" name="Google Shape;405;p60"/>
           <p:cNvSpPr txBox="1"/>
           <p:nvPr>
             <p:ph type="title"/>
@@ -39903,7 +39648,7 @@
       </p:sp>
       <p:sp>
         <p:nvSpPr>
-          <p:cNvPr id="413" name="Google Shape;413;p61"/>
+          <p:cNvPr id="406" name="Google Shape;406;p60"/>
           <p:cNvSpPr txBox="1"/>
           <p:nvPr/>
         </p:nvSpPr>
@@ -40538,7 +40283,7 @@
       </p:sp>
       <p:sp>
         <p:nvSpPr>
-          <p:cNvPr id="414" name="Google Shape;414;p61"/>
+          <p:cNvPr id="407" name="Google Shape;407;p60"/>
           <p:cNvSpPr txBox="1"/>
           <p:nvPr/>
         </p:nvSpPr>
@@ -40728,7 +40473,7 @@
       </p:sp>
       <p:sp>
         <p:nvSpPr>
-          <p:cNvPr id="415" name="Google Shape;415;p61"/>
+          <p:cNvPr id="408" name="Google Shape;408;p60"/>
           <p:cNvSpPr txBox="1"/>
           <p:nvPr/>
         </p:nvSpPr>
@@ -40784,12 +40529,12 @@
 </p:sld>
 </file>
 
-<file path=ppt/slides/slide35.xml><?xml version="1.0" encoding="utf-8"?>
+<file path=ppt/slides/slide34.xml><?xml version="1.0" encoding="utf-8"?>
 <p:sld xmlns:a="http://schemas.openxmlformats.org/drawingml/2006/main" xmlns:r="http://schemas.openxmlformats.org/officeDocument/2006/relationships" xmlns:mc="http://schemas.openxmlformats.org/markup-compatibility/2006" xmlns:mv="urn:schemas-microsoft-com:mac:vml" xmlns:p="http://schemas.openxmlformats.org/presentationml/2006/main" xmlns:c="http://schemas.openxmlformats.org/drawingml/2006/chart" xmlns:dgm="http://schemas.openxmlformats.org/drawingml/2006/diagram" xmlns:o="urn:schemas-microsoft-com:office:office" xmlns:v="urn:schemas-microsoft-com:vml" xmlns:pvml="urn:schemas-microsoft-com:office:powerpoint" xmlns:com="http://schemas.openxmlformats.org/drawingml/2006/compatibility" xmlns:p14="http://schemas.microsoft.com/office/powerpoint/2010/main" xmlns:p15="http://schemas.microsoft.com/office/powerpoint/2012/main" xmlns:ahyp="http://schemas.microsoft.com/office/drawing/2018/hyperlinkcolor">
   <p:cSld>
     <p:spTree>
       <p:nvGrpSpPr>
-        <p:cNvPr id="419" name="Shape 419"/>
+        <p:cNvPr id="412" name="Shape 412"/>
         <p:cNvGrpSpPr/>
         <p:nvPr/>
       </p:nvGrpSpPr>
@@ -40803,7 +40548,7 @@
       </p:grpSpPr>
       <p:sp>
         <p:nvSpPr>
-          <p:cNvPr id="420" name="Google Shape;420;p62"/>
+          <p:cNvPr id="413" name="Google Shape;413;p61"/>
           <p:cNvSpPr txBox="1"/>
           <p:nvPr>
             <p:ph type="title"/>
@@ -40855,7 +40600,7 @@
       </p:sp>
       <p:sp>
         <p:nvSpPr>
-          <p:cNvPr id="421" name="Google Shape;421;p62"/>
+          <p:cNvPr id="414" name="Google Shape;414;p61"/>
           <p:cNvSpPr txBox="1"/>
           <p:nvPr>
             <p:ph idx="1" type="body"/>
@@ -41141,12 +40886,12 @@
 </p:sld>
 </file>
 
-<file path=ppt/slides/slide36.xml><?xml version="1.0" encoding="utf-8"?>
+<file path=ppt/slides/slide35.xml><?xml version="1.0" encoding="utf-8"?>
 <p:sld xmlns:a="http://schemas.openxmlformats.org/drawingml/2006/main" xmlns:r="http://schemas.openxmlformats.org/officeDocument/2006/relationships" xmlns:mc="http://schemas.openxmlformats.org/markup-compatibility/2006" xmlns:mv="urn:schemas-microsoft-com:mac:vml" xmlns:p="http://schemas.openxmlformats.org/presentationml/2006/main" xmlns:c="http://schemas.openxmlformats.org/drawingml/2006/chart" xmlns:dgm="http://schemas.openxmlformats.org/drawingml/2006/diagram" xmlns:o="urn:schemas-microsoft-com:office:office" xmlns:v="urn:schemas-microsoft-com:vml" xmlns:pvml="urn:schemas-microsoft-com:office:powerpoint" xmlns:com="http://schemas.openxmlformats.org/drawingml/2006/compatibility" xmlns:p14="http://schemas.microsoft.com/office/powerpoint/2010/main" xmlns:p15="http://schemas.microsoft.com/office/powerpoint/2012/main" xmlns:ahyp="http://schemas.microsoft.com/office/drawing/2018/hyperlinkcolor">
   <p:cSld>
     <p:spTree>
       <p:nvGrpSpPr>
-        <p:cNvPr id="425" name="Shape 425"/>
+        <p:cNvPr id="418" name="Shape 418"/>
         <p:cNvGrpSpPr/>
         <p:nvPr/>
       </p:nvGrpSpPr>
@@ -41160,7 +40905,7 @@
       </p:grpSpPr>
       <p:sp>
         <p:nvSpPr>
-          <p:cNvPr id="426" name="Google Shape;426;p63"/>
+          <p:cNvPr id="419" name="Google Shape;419;p62"/>
           <p:cNvSpPr txBox="1"/>
           <p:nvPr>
             <p:ph idx="1" type="body"/>
@@ -41203,7 +40948,7 @@
       </p:sp>
       <p:sp>
         <p:nvSpPr>
-          <p:cNvPr id="427" name="Google Shape;427;p63"/>
+          <p:cNvPr id="420" name="Google Shape;420;p62"/>
           <p:cNvSpPr txBox="1"/>
           <p:nvPr>
             <p:ph type="title"/>
@@ -41249,12 +40994,12 @@
 </p:sld>
 </file>
 
-<file path=ppt/slides/slide37.xml><?xml version="1.0" encoding="utf-8"?>
+<file path=ppt/slides/slide36.xml><?xml version="1.0" encoding="utf-8"?>
 <p:sld xmlns:a="http://schemas.openxmlformats.org/drawingml/2006/main" xmlns:r="http://schemas.openxmlformats.org/officeDocument/2006/relationships" xmlns:mc="http://schemas.openxmlformats.org/markup-compatibility/2006" xmlns:mv="urn:schemas-microsoft-com:mac:vml" xmlns:p="http://schemas.openxmlformats.org/presentationml/2006/main" xmlns:c="http://schemas.openxmlformats.org/drawingml/2006/chart" xmlns:dgm="http://schemas.openxmlformats.org/drawingml/2006/diagram" xmlns:o="urn:schemas-microsoft-com:office:office" xmlns:v="urn:schemas-microsoft-com:vml" xmlns:pvml="urn:schemas-microsoft-com:office:powerpoint" xmlns:com="http://schemas.openxmlformats.org/drawingml/2006/compatibility" xmlns:p14="http://schemas.microsoft.com/office/powerpoint/2010/main" xmlns:p15="http://schemas.microsoft.com/office/powerpoint/2012/main" xmlns:ahyp="http://schemas.microsoft.com/office/drawing/2018/hyperlinkcolor">
   <p:cSld>
     <p:spTree>
       <p:nvGrpSpPr>
-        <p:cNvPr id="431" name="Shape 431"/>
+        <p:cNvPr id="424" name="Shape 424"/>
         <p:cNvGrpSpPr/>
         <p:nvPr/>
       </p:nvGrpSpPr>
@@ -41268,7 +41013,7 @@
       </p:grpSpPr>
       <p:sp>
         <p:nvSpPr>
-          <p:cNvPr id="432" name="Google Shape;432;p64"/>
+          <p:cNvPr id="425" name="Google Shape;425;p63"/>
           <p:cNvSpPr txBox="1"/>
           <p:nvPr>
             <p:ph type="title"/>
@@ -41320,7 +41065,7 @@
       </p:sp>
       <p:sp>
         <p:nvSpPr>
-          <p:cNvPr id="433" name="Google Shape;433;p64"/>
+          <p:cNvPr id="426" name="Google Shape;426;p63"/>
           <p:cNvSpPr/>
           <p:nvPr/>
         </p:nvSpPr>
@@ -41365,7 +41110,7 @@
       </p:sp>
       <p:sp>
         <p:nvSpPr>
-          <p:cNvPr id="434" name="Google Shape;434;p64"/>
+          <p:cNvPr id="427" name="Google Shape;427;p63"/>
           <p:cNvSpPr txBox="1"/>
           <p:nvPr/>
         </p:nvSpPr>
@@ -41426,7 +41171,7 @@
       </p:sp>
       <p:sp>
         <p:nvSpPr>
-          <p:cNvPr id="435" name="Google Shape;435;p64"/>
+          <p:cNvPr id="428" name="Google Shape;428;p63"/>
           <p:cNvSpPr txBox="1"/>
           <p:nvPr/>
         </p:nvSpPr>
@@ -41487,7 +41232,7 @@
       </p:sp>
       <p:sp>
         <p:nvSpPr>
-          <p:cNvPr id="436" name="Google Shape;436;p64"/>
+          <p:cNvPr id="429" name="Google Shape;429;p63"/>
           <p:cNvSpPr/>
           <p:nvPr/>
         </p:nvSpPr>
@@ -41532,7 +41277,7 @@
       </p:sp>
       <p:sp>
         <p:nvSpPr>
-          <p:cNvPr id="437" name="Google Shape;437;p64"/>
+          <p:cNvPr id="430" name="Google Shape;430;p63"/>
           <p:cNvSpPr txBox="1"/>
           <p:nvPr/>
         </p:nvSpPr>
@@ -41593,7 +41338,7 @@
       </p:sp>
       <p:sp>
         <p:nvSpPr>
-          <p:cNvPr id="438" name="Google Shape;438;p64"/>
+          <p:cNvPr id="431" name="Google Shape;431;p63"/>
           <p:cNvSpPr txBox="1"/>
           <p:nvPr/>
         </p:nvSpPr>
@@ -41654,7 +41399,7 @@
       </p:sp>
       <p:sp>
         <p:nvSpPr>
-          <p:cNvPr id="439" name="Google Shape;439;p64"/>
+          <p:cNvPr id="432" name="Google Shape;432;p63"/>
           <p:cNvSpPr/>
           <p:nvPr/>
         </p:nvSpPr>
@@ -41699,7 +41444,7 @@
       </p:sp>
       <p:sp>
         <p:nvSpPr>
-          <p:cNvPr id="440" name="Google Shape;440;p64"/>
+          <p:cNvPr id="433" name="Google Shape;433;p63"/>
           <p:cNvSpPr txBox="1"/>
           <p:nvPr/>
         </p:nvSpPr>
@@ -41760,7 +41505,7 @@
       </p:sp>
       <p:sp>
         <p:nvSpPr>
-          <p:cNvPr id="441" name="Google Shape;441;p64"/>
+          <p:cNvPr id="434" name="Google Shape;434;p63"/>
           <p:cNvSpPr txBox="1"/>
           <p:nvPr/>
         </p:nvSpPr>
@@ -41821,7 +41566,7 @@
       </p:sp>
       <p:sp>
         <p:nvSpPr>
-          <p:cNvPr id="442" name="Google Shape;442;p64"/>
+          <p:cNvPr id="435" name="Google Shape;435;p63"/>
           <p:cNvSpPr/>
           <p:nvPr/>
         </p:nvSpPr>
@@ -41866,7 +41611,7 @@
       </p:sp>
       <p:sp>
         <p:nvSpPr>
-          <p:cNvPr id="443" name="Google Shape;443;p64"/>
+          <p:cNvPr id="436" name="Google Shape;436;p63"/>
           <p:cNvSpPr txBox="1"/>
           <p:nvPr/>
         </p:nvSpPr>
@@ -41927,7 +41672,7 @@
       </p:sp>
       <p:sp>
         <p:nvSpPr>
-          <p:cNvPr id="444" name="Google Shape;444;p64"/>
+          <p:cNvPr id="437" name="Google Shape;437;p63"/>
           <p:cNvSpPr txBox="1"/>
           <p:nvPr/>
         </p:nvSpPr>
@@ -42023,7 +41768,7 @@
       </p:sp>
       <p:pic>
         <p:nvPicPr>
-          <p:cNvPr id="445" name="Google Shape;445;p64"/>
+          <p:cNvPr id="438" name="Google Shape;438;p63"/>
           <p:cNvPicPr preferRelativeResize="0"/>
           <p:nvPr/>
         </p:nvPicPr>
@@ -42057,7 +41802,7 @@
       </p:pic>
       <p:pic>
         <p:nvPicPr>
-          <p:cNvPr id="446" name="Google Shape;446;p64"/>
+          <p:cNvPr id="439" name="Google Shape;439;p63"/>
           <p:cNvPicPr preferRelativeResize="0"/>
           <p:nvPr/>
         </p:nvPicPr>
@@ -42091,7 +41836,7 @@
       </p:pic>
       <p:pic>
         <p:nvPicPr>
-          <p:cNvPr id="447" name="Google Shape;447;p64"/>
+          <p:cNvPr id="440" name="Google Shape;440;p63"/>
           <p:cNvPicPr preferRelativeResize="0"/>
           <p:nvPr/>
         </p:nvPicPr>
@@ -42125,7 +41870,7 @@
       </p:pic>
       <p:pic>
         <p:nvPicPr>
-          <p:cNvPr id="448" name="Google Shape;448;p64"/>
+          <p:cNvPr id="441" name="Google Shape;441;p63"/>
           <p:cNvPicPr preferRelativeResize="0"/>
           <p:nvPr/>
         </p:nvPicPr>
@@ -42165,12 +41910,12 @@
 </p:sld>
 </file>
 
-<file path=ppt/slides/slide38.xml><?xml version="1.0" encoding="utf-8"?>
+<file path=ppt/slides/slide37.xml><?xml version="1.0" encoding="utf-8"?>
 <p:sld xmlns:a="http://schemas.openxmlformats.org/drawingml/2006/main" xmlns:r="http://schemas.openxmlformats.org/officeDocument/2006/relationships" xmlns:mc="http://schemas.openxmlformats.org/markup-compatibility/2006" xmlns:mv="urn:schemas-microsoft-com:mac:vml" xmlns:p="http://schemas.openxmlformats.org/presentationml/2006/main" xmlns:c="http://schemas.openxmlformats.org/drawingml/2006/chart" xmlns:dgm="http://schemas.openxmlformats.org/drawingml/2006/diagram" xmlns:o="urn:schemas-microsoft-com:office:office" xmlns:v="urn:schemas-microsoft-com:vml" xmlns:pvml="urn:schemas-microsoft-com:office:powerpoint" xmlns:com="http://schemas.openxmlformats.org/drawingml/2006/compatibility" xmlns:p14="http://schemas.microsoft.com/office/powerpoint/2010/main" xmlns:p15="http://schemas.microsoft.com/office/powerpoint/2012/main" xmlns:ahyp="http://schemas.microsoft.com/office/drawing/2018/hyperlinkcolor">
   <p:cSld>
     <p:spTree>
       <p:nvGrpSpPr>
-        <p:cNvPr id="452" name="Shape 452"/>
+        <p:cNvPr id="445" name="Shape 445"/>
         <p:cNvGrpSpPr/>
         <p:nvPr/>
       </p:nvGrpSpPr>
@@ -42184,7 +41929,7 @@
       </p:grpSpPr>
       <p:sp>
         <p:nvSpPr>
-          <p:cNvPr id="453" name="Google Shape;453;p65"/>
+          <p:cNvPr id="446" name="Google Shape;446;p64"/>
           <p:cNvSpPr txBox="1"/>
           <p:nvPr>
             <p:ph type="title"/>
@@ -42236,7 +41981,7 @@
       </p:sp>
       <p:sp>
         <p:nvSpPr>
-          <p:cNvPr id="454" name="Google Shape;454;p65"/>
+          <p:cNvPr id="447" name="Google Shape;447;p64"/>
           <p:cNvSpPr txBox="1"/>
           <p:nvPr>
             <p:ph idx="1" type="body"/>

</xml_diff>